<commit_message>
Modify each file data name
- Implementing a button that can
  stop a coroutine function

- Implement a video player to run
  using ray cast

- Adding and deleting resource data
</commit_message>
<xml_diff>
--- a/Assets/Class/Mouse Drag Function/PPT Data/Mouse Drag Example.pptx
+++ b/Assets/Class/Mouse Drag Function/PPT Data/Mouse Drag Example.pptx
@@ -2,7 +2,7 @@
 <file path=ppt/presentation.xml><?xml version="1.0" encoding="utf-8"?>
 <p:presentation xmlns:a="http://schemas.openxmlformats.org/drawingml/2006/main" xmlns:r="http://schemas.openxmlformats.org/officeDocument/2006/relationships" xmlns:p="http://schemas.openxmlformats.org/presentationml/2006/main" xmlns:p14="http://schemas.microsoft.com/office/powerpoint/2010/main" saveSubsetFonts="1" firstSlideNum="0">
   <p:sldMasterIdLst>
-    <p:sldMasterId id="2147485401" r:id="rId12"/>
+    <p:sldMasterId id="2147485417" r:id="rId12"/>
   </p:sldMasterIdLst>
   <p:notesMasterIdLst>
     <p:notesMasterId r:id="rId14"/>
@@ -5386,8 +5386,8 @@
         </p:nvSpPr>
         <p:spPr>
           <a:xfrm rot="0">
-            <a:off x="4527550" y="394335"/>
-            <a:ext cx="3145790" cy="554990"/>
+            <a:off x="4519295" y="375285"/>
+            <a:ext cx="3146425" cy="478155"/>
           </a:xfrm>
           <a:prstGeom prst="rect"/>
           <a:noFill/>
@@ -5402,36 +5402,26 @@
           </a:bodyPr>
           <a:lstStyle/>
           <a:p>
-            <a:pPr marL="0" indent="0" rtl="0" algn="l" defTabSz="914400" eaLnBrk="1" latinLnBrk="0" hangingPunct="1">
-              <a:buFontTx/>
-              <a:buNone/>
-            </a:pPr>
-            <a:r>
-              <a:rPr lang="ko-KR" sz="3000" b="1">
+            <a:pPr marL="0" indent="0" rtl="0" algn="ctr" defTabSz="914400" eaLnBrk="1" latinLnBrk="0" hangingPunct="1">
+              <a:buFontTx/>
+              <a:buNone/>
+            </a:pPr>
+            <a:r>
+              <a:rPr lang="ko-KR" sz="2500" b="1">
                 <a:solidFill>
                   <a:schemeClr val="tx1"/>
                 </a:solidFill>
-                <a:latin typeface="맑은 고딕" charset="0"/>
-                <a:ea typeface="맑은 고딕" charset="0"/>
-              </a:rPr>
-              <a:t>첫 번째 </a:t>
-            </a:r>
-            <a:r>
-              <a:rPr lang="ko-KR" sz="3000" b="1">
-                <a:solidFill>
-                  <a:schemeClr val="tx1"/>
-                </a:solidFill>
-                <a:latin typeface="맑은 고딕" charset="0"/>
-                <a:ea typeface="맑은 고딕" charset="0"/>
-              </a:rPr>
-              <a:t>튜토리얼</a:t>
-            </a:r>
-            <a:endParaRPr lang="ko-KR" altLang="en-US" sz="3000" b="1">
+                <a:latin typeface="나눔바른고딕" charset="0"/>
+                <a:ea typeface="나눔바른고딕" charset="0"/>
+              </a:rPr>
+              <a:t>첫 번째 튜토리얼</a:t>
+            </a:r>
+            <a:endParaRPr lang="ko-KR" altLang="en-US" sz="2500" b="1">
               <a:solidFill>
                 <a:schemeClr val="tx1"/>
               </a:solidFill>
-              <a:latin typeface="맑은 고딕" charset="0"/>
-              <a:ea typeface="맑은 고딕" charset="0"/>
+              <a:latin typeface="나눔바른고딕" charset="0"/>
+              <a:ea typeface="나눔바른고딕" charset="0"/>
             </a:endParaRPr>
           </a:p>
         </p:txBody>
@@ -5446,8 +5436,8 @@
         </p:nvSpPr>
         <p:spPr>
           <a:xfrm rot="0">
-            <a:off x="1438275" y="2921635"/>
-            <a:ext cx="3933190" cy="954405"/>
+            <a:off x="1238250" y="5150485"/>
+            <a:ext cx="4134485" cy="954405"/>
           </a:xfrm>
           <a:prstGeom prst="rect"/>
           <a:noFill/>
@@ -5491,7 +5481,56 @@
                 <a:latin typeface="맑은 고딕" charset="0"/>
                 <a:ea typeface="맑은 고딕" charset="0"/>
               </a:rPr>
-              <a:t>첫 번째로 Main Camera를 선택하고 위치와 회전 값을 설정합니다.</a:t>
+              <a:t>첫</a:t>
+            </a:r>
+            <a:r>
+              <a:rPr lang="ko-KR" sz="1800">
+                <a:latin typeface="맑은 고딕" charset="0"/>
+                <a:ea typeface="맑은 고딕" charset="0"/>
+              </a:rPr>
+              <a:t> </a:t>
+            </a:r>
+            <a:r>
+              <a:rPr lang="ko-KR" sz="1800">
+                <a:latin typeface="맑은 고딕" charset="0"/>
+                <a:ea typeface="맑은 고딕" charset="0"/>
+              </a:rPr>
+              <a:t>번째로</a:t>
+            </a:r>
+            <a:r>
+              <a:rPr lang="ko-KR" sz="1800">
+                <a:latin typeface="맑은 고딕" charset="0"/>
+                <a:ea typeface="맑은 고딕" charset="0"/>
+              </a:rPr>
+              <a:t> </a:t>
+            </a:r>
+            <a:r>
+              <a:rPr lang="ko-KR" sz="1800">
+                <a:latin typeface="맑은 고딕" charset="0"/>
+                <a:ea typeface="맑은 고딕" charset="0"/>
+              </a:rPr>
+              <a:t>3D Object에서 </a:t>
+            </a:r>
+            <a:r>
+              <a:rPr lang="ko-KR" sz="1800">
+                <a:latin typeface="맑은 고딕" charset="0"/>
+                <a:ea typeface="맑은 고딕" charset="0"/>
+              </a:rPr>
+              <a:t>Plane을</a:t>
+            </a:r>
+            <a:r>
+              <a:rPr lang="ko-KR" sz="1800">
+                <a:latin typeface="맑은 고딕" charset="0"/>
+                <a:ea typeface="맑은 고딕" charset="0"/>
+              </a:rPr>
+              <a:t> 생성</a:t>
+            </a:r>
+            <a:r>
+              <a:rPr lang="ko-KR" sz="1800">
+                <a:latin typeface="맑은 고딕" charset="0"/>
+                <a:ea typeface="맑은 고딕" charset="0"/>
+              </a:rPr>
+              <a:t>하고 Ground라는 이름으로 정의합니다.</a:t>
             </a:r>
             <a:endParaRPr lang="ko-KR" altLang="en-US" sz="1800">
               <a:latin typeface="맑은 고딕" charset="0"/>
@@ -5510,8 +5549,8 @@
         </p:nvSpPr>
         <p:spPr>
           <a:xfrm rot="0">
-            <a:off x="6835140" y="4721225"/>
-            <a:ext cx="4037330" cy="1508125"/>
+            <a:off x="6807200" y="4323715"/>
+            <a:ext cx="4156710" cy="1784985"/>
           </a:xfrm>
           <a:prstGeom prst="rect"/>
           <a:noFill/>
@@ -5538,7 +5577,7 @@
                 <a:latin typeface="맑은 고딕" charset="0"/>
                 <a:ea typeface="맑은 고딕" charset="0"/>
               </a:rPr>
-              <a:t>3</a:t>
+              <a:t>2</a:t>
             </a:r>
             <a:r>
               <a:rPr sz="2000" b="1">
@@ -5565,7 +5604,14 @@
                 <a:latin typeface="맑은 고딕" charset="0"/>
                 <a:ea typeface="맑은 고딕" charset="0"/>
               </a:rPr>
-              <a:t>그런 다음 3D Object에서 Cube를 생성합니다.</a:t>
+              <a:t>그런 다음 3D Object에서 Cube를 생성</a:t>
+            </a:r>
+            <a:r>
+              <a:rPr lang="ko-KR" sz="1800">
+                <a:latin typeface="맑은 고딕" charset="0"/>
+                <a:ea typeface="맑은 고딕" charset="0"/>
+              </a:rPr>
+              <a:t>하고 Physical Box 라는 이름으로 정의합니다.</a:t>
             </a:r>
             <a:endParaRPr lang="ko-KR" altLang="en-US" sz="1800">
               <a:latin typeface="맑은 고딕" charset="0"/>
@@ -5592,21 +5638,42 @@
                 <a:latin typeface="맑은 고딕" charset="0"/>
                 <a:ea typeface="맑은 고딕" charset="0"/>
               </a:rPr>
-              <a:t>그리고 </a:t>
+              <a:t>그리고</a:t>
             </a:r>
             <a:r>
               <a:rPr lang="ko-KR" sz="1800">
                 <a:latin typeface="맑은 고딕" charset="0"/>
                 <a:ea typeface="맑은 고딕" charset="0"/>
               </a:rPr>
-              <a:t>Special </a:t>
+              <a:t> </a:t>
             </a:r>
             <a:r>
               <a:rPr lang="ko-KR" sz="1800">
                 <a:latin typeface="맑은 고딕" charset="0"/>
                 <a:ea typeface="맑은 고딕" charset="0"/>
               </a:rPr>
-              <a:t>스크립트를 생성한 다음 Cube에 넣어줍니다.</a:t>
+              <a:t>Mouse</a:t>
+            </a:r>
+            <a:r>
+              <a:rPr lang="ko-KR" sz="1800">
+                <a:latin typeface="맑은 고딕" charset="0"/>
+                <a:ea typeface="맑은 고딕" charset="0"/>
+              </a:rPr>
+              <a:t> 스크립트를 생성</a:t>
+            </a:r>
+            <a:r>
+              <a:rPr lang="ko-KR" sz="1800">
+                <a:latin typeface="맑은 고딕" charset="0"/>
+                <a:ea typeface="맑은 고딕" charset="0"/>
+              </a:rPr>
+              <a:t>하고 Physical Box 오브젝트</a:t>
+            </a:r>
+            <a:r>
+              <a:rPr lang="ko-KR" sz="1800">
+                <a:latin typeface="맑은 고딕" charset="0"/>
+                <a:ea typeface="맑은 고딕" charset="0"/>
+              </a:rPr>
+              <a:t>에 넣어줍니다.</a:t>
             </a:r>
             <a:endParaRPr lang="ko-KR" altLang="en-US" sz="1800">
               <a:latin typeface="맑은 고딕" charset="0"/>
@@ -5617,38 +5684,7 @@
       </p:sp>
       <p:pic>
         <p:nvPicPr>
-          <p:cNvPr id="26" name="그림 4" descr="C:/Users/Admin1/AppData/Roaming/PolarisOffice/ETemp/19428_13742608/fImage18947578467.png"/>
-          <p:cNvPicPr>
-            <a:picLocks noChangeAspect="1"/>
-          </p:cNvPicPr>
-          <p:nvPr/>
-        </p:nvPicPr>
-        <p:blipFill rotWithShape="1">
-          <a:blip r:embed="rId18" cstate="hqprint">
-            <a:extLst>
-              <a:ext uri="{28A0092B-C50C-407E-A947-70E740481C1C}">
-                <a14:useLocalDpi xmlns:a14="http://schemas.microsoft.com/office/drawing/2010/main"/>
-              </a:ext>
-            </a:extLst>
-          </a:blip>
-          <a:stretch>
-            <a:fillRect/>
-          </a:stretch>
-        </p:blipFill>
-        <p:spPr>
-          <a:xfrm rot="0">
-            <a:off x="1438910" y="1313180"/>
-            <a:ext cx="3924300" cy="1497965"/>
-          </a:xfrm>
-          <a:prstGeom prst="roundRect"/>
-          <a:solidFill>
-            <a:srgbClr val="EDEDED"/>
-          </a:solidFill>
-        </p:spPr>
-      </p:pic>
-      <p:pic>
-        <p:nvPicPr>
-          <p:cNvPr id="28" name="그림 9" descr="C:/Users/Admin1/AppData/Roaming/PolarisOffice/ETemp/19428_13742608/fImage16105616500.png"/>
+          <p:cNvPr id="28" name="그림 9" descr="C:/Users/Admin1/AppData/Roaming/PolarisOffice/ETemp/16636_18866920/fImage16105616500.png"/>
           <p:cNvPicPr>
             <a:picLocks noChangeAspect="1"/>
           </p:cNvPicPr>
@@ -5668,8 +5704,8 @@
         </p:blipFill>
         <p:spPr>
           <a:xfrm rot="0">
-            <a:off x="6833235" y="1304925"/>
-            <a:ext cx="2334895" cy="3227705"/>
+            <a:off x="6816725" y="1446530"/>
+            <a:ext cx="2710815" cy="2687955"/>
           </a:xfrm>
           <a:prstGeom prst="roundRect"/>
           <a:solidFill>
@@ -5681,15 +5717,15 @@
         <p:nvCxnSpPr>
           <p:cNvPr id="30" name="도형 13"/>
           <p:cNvCxnSpPr>
-            <a:stCxn id="37" idx="0"/>
-            <a:endCxn id="36" idx="2"/>
+            <a:stCxn id="39" idx="0"/>
+            <a:endCxn id="42" idx="2"/>
           </p:cNvCxnSpPr>
           <p:nvPr/>
         </p:nvCxnSpPr>
         <p:spPr>
           <a:xfrm rot="0" flipH="1" flipV="1">
-            <a:off x="10158730" y="2862580"/>
-            <a:ext cx="5080" cy="662305"/>
+            <a:off x="10329545" y="2828925"/>
+            <a:ext cx="2540" cy="534035"/>
           </a:xfrm>
           <a:prstGeom prst="straightConnector1"/>
           <a:ln w="6350" cap="flat" cmpd="sng">
@@ -5714,14 +5750,45 @@
       </p:cxnSp>
       <p:pic>
         <p:nvPicPr>
-          <p:cNvPr id="31" name="그림 23" descr="C:/Users/Admin1/AppData/Roaming/PolarisOffice/ETemp/19428_13742608/fImage18521545724.png"/>
+          <p:cNvPr id="39" name="그림 4" descr="C:/Users/Admin1/AppData/Roaming/PolarisOffice/ETemp/16636_18866920/fImage202511141.png"/>
           <p:cNvPicPr>
             <a:picLocks noChangeAspect="1"/>
           </p:cNvPicPr>
           <p:nvPr/>
         </p:nvPicPr>
         <p:blipFill rotWithShape="1">
-          <a:blip r:embed="rId22" cstate="hqprint">
+          <a:blip r:embed="rId27" cstate="print">
+            <a:extLst>
+              <a:ext uri="{28A0092B-C50C-407E-A947-70E740481C1C}">
+                <a14:useLocalDpi xmlns:a14="http://schemas.microsoft.com/office/drawing/2010/main" val="0"/>
+              </a:ext>
+            </a:extLst>
+          </a:blip>
+          <a:stretch>
+            <a:fillRect/>
+          </a:stretch>
+        </p:blipFill>
+        <p:spPr>
+          <a:xfrm rot="0">
+            <a:off x="9966960" y="3362325"/>
+            <a:ext cx="730250" cy="772160"/>
+          </a:xfrm>
+          <a:prstGeom prst="roundRect"/>
+          <a:solidFill>
+            <a:srgbClr val="EDEDED"/>
+          </a:solidFill>
+        </p:spPr>
+      </p:pic>
+      <p:pic>
+        <p:nvPicPr>
+          <p:cNvPr id="40" name="그림 21" descr="C:/Users/Admin1/AppData/Roaming/PolarisOffice/ETemp/16636_18866920/fImage159531218467.png"/>
+          <p:cNvPicPr>
+            <a:picLocks noChangeAspect="1"/>
+          </p:cNvPicPr>
+          <p:nvPr/>
+        </p:nvPicPr>
+        <p:blipFill rotWithShape="1">
+          <a:blip r:embed="rId28" cstate="hqprint">
             <a:extLst>
               <a:ext uri="{28A0092B-C50C-407E-A947-70E740481C1C}">
                 <a14:useLocalDpi xmlns:a14="http://schemas.microsoft.com/office/drawing/2010/main"/>
@@ -5734,8 +5801,8 @@
         </p:blipFill>
         <p:spPr>
           <a:xfrm rot="0">
-            <a:off x="4614545" y="4211955"/>
-            <a:ext cx="756920" cy="779780"/>
+            <a:off x="1228725" y="1438275"/>
+            <a:ext cx="2648585" cy="3486785"/>
           </a:xfrm>
           <a:prstGeom prst="roundRect"/>
           <a:solidFill>
@@ -5743,80 +5810,16 @@
           </a:solidFill>
         </p:spPr>
       </p:pic>
-      <p:sp>
-        <p:nvSpPr>
-          <p:cNvPr id="34" name="텍스트 상자 26"/>
-          <p:cNvSpPr txBox="1">
-            <a:spLocks/>
-          </p:cNvSpPr>
-          <p:nvPr/>
-        </p:nvSpPr>
-        <p:spPr>
-          <a:xfrm rot="0">
-            <a:off x="1443990" y="5281295"/>
-            <a:ext cx="3924935" cy="955040"/>
-          </a:xfrm>
-          <a:prstGeom prst="rect"/>
-          <a:noFill/>
-          <a:ln w="0">
-            <a:noFill/>
-            <a:prstDash/>
-          </a:ln>
-        </p:spPr>
-        <p:txBody>
-          <a:bodyPr wrap="square" lIns="89535" tIns="46355" rIns="89535" bIns="46355" numCol="1" vert="horz" anchor="t">
-            <a:spAutoFit/>
-          </a:bodyPr>
-          <a:lstStyle/>
-          <a:p>
-            <a:pPr marL="0" indent="0" rtl="0" algn="l" defTabSz="914400" eaLnBrk="1" latinLnBrk="0" hangingPunct="1">
-              <a:buFontTx/>
-              <a:buNone/>
-            </a:pPr>
-            <a:r>
-              <a:rPr sz="2000" b="1">
-                <a:solidFill>
-                  <a:srgbClr val="0611F2"/>
-                </a:solidFill>
-                <a:latin typeface="맑은 고딕" charset="0"/>
-                <a:ea typeface="맑은 고딕" charset="0"/>
-              </a:rPr>
-              <a:t>2.</a:t>
-            </a:r>
-            <a:r>
-              <a:rPr lang="ko-KR" sz="2000" b="1">
-                <a:solidFill>
-                  <a:srgbClr val="0611F2"/>
-                </a:solidFill>
-                <a:latin typeface="맑은 고딕" charset="0"/>
-                <a:ea typeface="맑은 고딕" charset="0"/>
-              </a:rPr>
-              <a:t> </a:t>
-            </a:r>
-            <a:r>
-              <a:rPr lang="ko-KR" sz="1800">
-                <a:latin typeface="맑은 고딕" charset="0"/>
-                <a:ea typeface="맑은 고딕" charset="0"/>
-              </a:rPr>
-              <a:t>그다음으로 Zoom 스크립트를 생성하고 Main Camera 오브젝트에 넣어줍니다.</a:t>
-            </a:r>
-            <a:endParaRPr lang="ko-KR" altLang="en-US" sz="1800">
-              <a:latin typeface="맑은 고딕" charset="0"/>
-              <a:ea typeface="맑은 고딕" charset="0"/>
-            </a:endParaRPr>
-          </a:p>
-        </p:txBody>
-      </p:sp>
       <p:pic>
         <p:nvPicPr>
-          <p:cNvPr id="35" name="그림 9" descr="C:/Users/Admin1/AppData/Roaming/PolarisOffice/ETemp/19428_13742608/fImage411211341.png"/>
+          <p:cNvPr id="41" name="그림 22" descr="C:/Users/Admin1/AppData/Roaming/PolarisOffice/ETemp/16636_18866920/fImage46921226334.png"/>
           <p:cNvPicPr>
             <a:picLocks noChangeAspect="1"/>
           </p:cNvPicPr>
           <p:nvPr/>
         </p:nvPicPr>
         <p:blipFill rotWithShape="1">
-          <a:blip r:embed="rId24" cstate="print">
+          <a:blip r:embed="rId29" cstate="print">
             <a:extLst>
               <a:ext uri="{28A0092B-C50C-407E-A947-70E740481C1C}">
                 <a14:useLocalDpi xmlns:a14="http://schemas.microsoft.com/office/drawing/2010/main" val="0"/>
@@ -5829,8 +5832,8 @@
         </p:blipFill>
         <p:spPr>
           <a:xfrm rot="0">
-            <a:off x="1435735" y="4025265"/>
-            <a:ext cx="2153920" cy="1069340"/>
+            <a:off x="4086225" y="2371725"/>
+            <a:ext cx="1286510" cy="1657985"/>
           </a:xfrm>
           <a:prstGeom prst="roundRect"/>
           <a:solidFill>
@@ -5838,50 +5841,16 @@
           </a:solidFill>
         </p:spPr>
       </p:pic>
-      <p:cxnSp>
-        <p:nvCxnSpPr>
-          <p:cNvPr id="32" name="도형 24"/>
-          <p:cNvCxnSpPr>
-            <a:stCxn id="31" idx="1"/>
-          </p:cNvCxnSpPr>
-          <p:nvPr/>
-        </p:nvCxnSpPr>
-        <p:spPr>
-          <a:xfrm rot="0" flipH="1">
-            <a:off x="3061970" y="4601210"/>
-            <a:ext cx="1553210" cy="9525"/>
-          </a:xfrm>
-          <a:prstGeom prst="straightConnector1"/>
-          <a:ln w="19050" cap="flat" cmpd="sng">
-            <a:prstDash/>
-            <a:tailEnd type="triangle" w="med" len="med"/>
-          </a:ln>
-        </p:spPr>
-        <p:style>
-          <a:lnRef idx="3">
-            <a:schemeClr val="accent2"/>
-          </a:lnRef>
-          <a:fillRef idx="0">
-            <a:schemeClr val="accent2"/>
-          </a:fillRef>
-          <a:effectRef idx="2">
-            <a:schemeClr val="accent2"/>
-          </a:effectRef>
-          <a:fontRef idx="minor">
-            <a:schemeClr val="tx1"/>
-          </a:fontRef>
-        </p:style>
-      </p:cxnSp>
       <p:pic>
         <p:nvPicPr>
-          <p:cNvPr id="36" name="그림 10" descr="C:/Users/Admin1/AppData/Roaming/PolarisOffice/ETemp/19428_13742608/fImage45321148467.png"/>
+          <p:cNvPr id="42" name="그림 25" descr="C:/Users/Admin1/AppData/Roaming/PolarisOffice/ETemp/16636_18866920/fImage54631236500.png"/>
           <p:cNvPicPr>
             <a:picLocks noChangeAspect="1"/>
           </p:cNvPicPr>
           <p:nvPr/>
         </p:nvPicPr>
         <p:blipFill rotWithShape="1">
-          <a:blip r:embed="rId25" cstate="print">
+          <a:blip r:embed="rId30" cstate="print">
             <a:extLst>
               <a:ext uri="{28A0092B-C50C-407E-A947-70E740481C1C}">
                 <a14:useLocalDpi xmlns:a14="http://schemas.microsoft.com/office/drawing/2010/main" val="0"/>
@@ -5894,39 +5863,8 @@
         </p:blipFill>
         <p:spPr>
           <a:xfrm rot="0">
-            <a:off x="9453245" y="1383665"/>
-            <a:ext cx="1411605" cy="1479550"/>
-          </a:xfrm>
-          <a:prstGeom prst="roundRect"/>
-          <a:solidFill>
-            <a:srgbClr val="EDEDED"/>
-          </a:solidFill>
-        </p:spPr>
-      </p:pic>
-      <p:pic>
-        <p:nvPicPr>
-          <p:cNvPr id="37" name="그림 75" descr="C:/Users/Admin1/AppData/Roaming/PolarisOffice/ETemp/19428_13742608/fImage21392316334.png"/>
-          <p:cNvPicPr>
-            <a:picLocks noChangeAspect="1"/>
-          </p:cNvPicPr>
-          <p:nvPr/>
-        </p:nvPicPr>
-        <p:blipFill rotWithShape="1">
-          <a:blip r:embed="rId26" cstate="print">
-            <a:extLst>
-              <a:ext uri="{28A0092B-C50C-407E-A947-70E740481C1C}">
-                <a14:useLocalDpi xmlns:a14="http://schemas.microsoft.com/office/drawing/2010/main" val="0"/>
-              </a:ext>
-            </a:extLst>
-          </a:blip>
-          <a:stretch>
-            <a:fillRect/>
-          </a:stretch>
-        </p:blipFill>
-        <p:spPr>
-          <a:xfrm rot="0">
-            <a:off x="9715500" y="3524250"/>
-            <a:ext cx="895985" cy="938530"/>
+            <a:off x="9686925" y="1438275"/>
+            <a:ext cx="1286510" cy="1391285"/>
           </a:xfrm>
           <a:prstGeom prst="roundRect"/>
           <a:solidFill>
@@ -5985,7 +5923,7 @@
         <p:spPr>
           <a:xfrm rot="0">
             <a:off x="4527550" y="405130"/>
-            <a:ext cx="3145790" cy="554990"/>
+            <a:ext cx="3150235" cy="478155"/>
           </a:xfrm>
           <a:prstGeom prst="rect"/>
           <a:noFill/>
@@ -6000,150 +5938,26 @@
           </a:bodyPr>
           <a:lstStyle/>
           <a:p>
-            <a:pPr marL="0" indent="0" rtl="0" algn="l" defTabSz="914400" eaLnBrk="1" latinLnBrk="0" hangingPunct="1">
-              <a:buFontTx/>
-              <a:buNone/>
-            </a:pPr>
-            <a:r>
-              <a:rPr lang="ko-KR" sz="3000" b="1">
+            <a:pPr marL="0" indent="0" rtl="0" algn="ctr" defTabSz="914400" eaLnBrk="1" latinLnBrk="0" hangingPunct="1">
+              <a:buFontTx/>
+              <a:buNone/>
+            </a:pPr>
+            <a:r>
+              <a:rPr lang="ko-KR" sz="2500" b="1">
                 <a:solidFill>
                   <a:schemeClr val="tx1"/>
                 </a:solidFill>
-                <a:latin typeface="맑은 고딕" charset="0"/>
-                <a:ea typeface="맑은 고딕" charset="0"/>
-              </a:rPr>
-              <a:t>두 번째 </a:t>
-            </a:r>
-            <a:r>
-              <a:rPr lang="ko-KR" sz="3000" b="1">
-                <a:solidFill>
-                  <a:schemeClr val="tx1"/>
-                </a:solidFill>
-                <a:latin typeface="맑은 고딕" charset="0"/>
-                <a:ea typeface="맑은 고딕" charset="0"/>
-              </a:rPr>
-              <a:t>튜토리얼</a:t>
-            </a:r>
-            <a:endParaRPr lang="ko-KR" altLang="en-US" sz="3000" b="1">
+                <a:latin typeface="나눔바른고딕" charset="0"/>
+                <a:ea typeface="나눔바른고딕" charset="0"/>
+              </a:rPr>
+              <a:t>두 번째 튜토리얼</a:t>
+            </a:r>
+            <a:endParaRPr lang="ko-KR" altLang="en-US" sz="2500" b="1">
               <a:solidFill>
                 <a:schemeClr val="tx1"/>
               </a:solidFill>
-              <a:latin typeface="맑은 고딕" charset="0"/>
-              <a:ea typeface="맑은 고딕" charset="0"/>
-            </a:endParaRPr>
-          </a:p>
-        </p:txBody>
-      </p:sp>
-      <p:sp>
-        <p:nvSpPr>
-          <p:cNvPr id="20" name="Rect 0"/>
-          <p:cNvSpPr txBox="1">
-            <a:spLocks/>
-          </p:cNvSpPr>
-          <p:nvPr/>
-        </p:nvSpPr>
-        <p:spPr>
-          <a:xfrm rot="0">
-            <a:off x="1228725" y="4939030"/>
-            <a:ext cx="4124960" cy="1200785"/>
-          </a:xfrm>
-          <a:prstGeom prst="rect"/>
-          <a:noFill/>
-          <a:ln w="0">
-            <a:noFill/>
-            <a:prstDash/>
-          </a:ln>
-        </p:spPr>
-        <p:txBody>
-          <a:bodyPr wrap="square" lIns="89535" tIns="46355" rIns="89535" bIns="46355" numCol="1" vert="horz" anchor="t">
-            <a:spAutoFit/>
-          </a:bodyPr>
-          <a:lstStyle/>
-          <a:p>
-            <a:pPr marL="0" indent="0" rtl="0" algn="l" defTabSz="914400" eaLnBrk="1" latinLnBrk="0" hangingPunct="1">
-              <a:buFontTx/>
-              <a:buNone/>
-            </a:pPr>
-            <a:r>
-              <a:rPr sz="1800">
-                <a:latin typeface="맑은 고딕" charset="0"/>
-                <a:ea typeface="맑은 고딕" charset="0"/>
-              </a:rPr>
-              <a:t>Mathf.Clamp( )</a:t>
-            </a:r>
-            <a:r>
-              <a:rPr lang="ko-KR" sz="1800">
-                <a:latin typeface="맑은 고딕" charset="0"/>
-                <a:ea typeface="맑은 고딕" charset="0"/>
-              </a:rPr>
-              <a:t> 함수</a:t>
-            </a:r>
-            <a:r>
-              <a:rPr sz="1800">
-                <a:latin typeface="맑은 고딕" charset="0"/>
-                <a:ea typeface="맑은 고딕" charset="0"/>
-              </a:rPr>
-              <a:t>는 제한하고 싶은 </a:t>
-            </a:r>
-            <a:r>
-              <a:rPr lang="ko-KR" sz="1800">
-                <a:latin typeface="맑은 고딕" charset="0"/>
-                <a:ea typeface="맑은 고딕" charset="0"/>
-              </a:rPr>
-              <a:t>게임 오브젝트의</a:t>
-            </a:r>
-            <a:r>
-              <a:rPr sz="1800">
-                <a:latin typeface="맑은 고딕" charset="0"/>
-                <a:ea typeface="맑은 고딕" charset="0"/>
-              </a:rPr>
-              <a:t> 속성</a:t>
-            </a:r>
-            <a:r>
-              <a:rPr lang="ko-KR" sz="1800">
-                <a:latin typeface="맑은 고딕" charset="0"/>
-                <a:ea typeface="맑은 고딕" charset="0"/>
-              </a:rPr>
-              <a:t>을 설정</a:t>
-            </a:r>
-            <a:r>
-              <a:rPr lang="ko-KR" sz="1800">
-                <a:latin typeface="맑은 고딕" charset="0"/>
-                <a:ea typeface="맑은 고딕" charset="0"/>
-              </a:rPr>
-              <a:t>하고</a:t>
-            </a:r>
-            <a:r>
-              <a:rPr lang="ko-KR" sz="1800">
-                <a:latin typeface="맑은 고딕" charset="0"/>
-                <a:ea typeface="맑은 고딕" charset="0"/>
-              </a:rPr>
-              <a:t> 최소값과 최대값을 지정하</a:t>
-            </a:r>
-            <a:r>
-              <a:rPr lang="ko-KR" sz="1800">
-                <a:latin typeface="맑은 고딕" charset="0"/>
-                <a:ea typeface="맑은 고딕" charset="0"/>
-              </a:rPr>
-              <a:t>여</a:t>
-            </a:r>
-            <a:r>
-              <a:rPr lang="ko-KR" sz="1800">
-                <a:latin typeface="맑은 고딕" charset="0"/>
-                <a:ea typeface="맑은 고딕" charset="0"/>
-              </a:rPr>
-              <a:t> 제한</a:t>
-            </a:r>
-            <a:r>
-              <a:rPr lang="ko-KR" sz="1800">
-                <a:latin typeface="맑은 고딕" charset="0"/>
-                <a:ea typeface="맑은 고딕" charset="0"/>
-              </a:rPr>
-              <a:t>하는 함수입니다.</a:t>
-            </a:r>
-            <a:endParaRPr lang="ko-KR" altLang="en-US" sz="1800">
-              <a:latin typeface="맑은 고딕" charset="0"/>
-              <a:ea typeface="맑은 고딕" charset="0"/>
+              <a:latin typeface="나눔바른고딕" charset="0"/>
+              <a:ea typeface="나눔바른고딕" charset="0"/>
             </a:endParaRPr>
           </a:p>
         </p:txBody>
@@ -6158,8 +5972,8 @@
         </p:nvSpPr>
         <p:spPr>
           <a:xfrm rot="0">
-            <a:off x="6828155" y="4361815"/>
-            <a:ext cx="4326255" cy="1784985"/>
+            <a:off x="6833870" y="4367530"/>
+            <a:ext cx="4110990" cy="1815465"/>
           </a:xfrm>
           <a:prstGeom prst="rect"/>
           <a:noFill/>
@@ -6203,41 +6017,350 @@
                 <a:latin typeface="맑은 고딕" charset="0"/>
                 <a:ea typeface="맑은 고딕" charset="0"/>
               </a:rPr>
-              <a:t>이제 Zoom 스크립트에서 Camera 오브젝트를 가져옵니다.</a:t>
+              <a:t>이제</a:t>
+            </a:r>
+            <a:r>
+              <a:rPr lang="ko-KR" sz="1800">
+                <a:latin typeface="맑은 고딕" charset="0"/>
+                <a:ea typeface="맑은 고딕" charset="0"/>
+              </a:rPr>
+              <a:t> Zoom 스크립트에서 Camera </a:t>
+            </a:r>
+            <a:r>
+              <a:rPr lang="ko-KR" sz="1800">
+                <a:latin typeface="맑은 고딕" charset="0"/>
+                <a:ea typeface="맑은 고딕" charset="0"/>
+              </a:rPr>
+              <a:t>변수</a:t>
+            </a:r>
+            <a:r>
+              <a:rPr lang="ko-KR" sz="1800">
+                <a:latin typeface="맑은 고딕" charset="0"/>
+                <a:ea typeface="맑은 고딕" charset="0"/>
+              </a:rPr>
+              <a:t>를 </a:t>
+            </a:r>
+            <a:r>
+              <a:rPr lang="ko-KR" sz="1800">
+                <a:latin typeface="맑은 고딕" charset="0"/>
+                <a:ea typeface="맑은 고딕" charset="0"/>
+              </a:rPr>
+              <a:t>선언합니다</a:t>
+            </a:r>
+            <a:r>
+              <a:rPr lang="ko-KR" sz="1800">
+                <a:latin typeface="맑은 고딕" charset="0"/>
+                <a:ea typeface="맑은 고딕" charset="0"/>
+              </a:rPr>
+              <a:t>.</a:t>
+            </a:r>
+            <a:endParaRPr lang="ko-KR" altLang="en-US" sz="2000" b="1">
+              <a:solidFill>
+                <a:srgbClr val="0611F2"/>
+              </a:solidFill>
+              <a:latin typeface="맑은 고딕" charset="0"/>
+              <a:ea typeface="맑은 고딕" charset="0"/>
+            </a:endParaRPr>
+          </a:p>
+          <a:p>
+            <a:pPr marL="0" indent="0" rtl="0" algn="l" defTabSz="914400" eaLnBrk="1" latinLnBrk="0" hangingPunct="1">
+              <a:buFontTx/>
+              <a:buNone/>
+            </a:pPr>
+            <a:endParaRPr lang="ko-KR" altLang="en-US" sz="2000" b="1">
+              <a:solidFill>
+                <a:srgbClr val="0611F2"/>
+              </a:solidFill>
+              <a:latin typeface="맑은 고딕" charset="0"/>
+              <a:ea typeface="맑은 고딕" charset="0"/>
+            </a:endParaRPr>
+          </a:p>
+          <a:p>
+            <a:pPr marL="0" indent="0" rtl="0" algn="l" defTabSz="914400" eaLnBrk="1" latinLnBrk="0" hangingPunct="1">
+              <a:buFontTx/>
+              <a:buNone/>
+            </a:pPr>
+            <a:r>
+              <a:rPr lang="ko-KR" sz="1800">
+                <a:latin typeface="맑은 고딕" charset="0"/>
+                <a:ea typeface="맑은 고딕" charset="0"/>
+              </a:rPr>
+              <a:t>그리고</a:t>
+            </a:r>
+            <a:r>
+              <a:rPr lang="ko-KR" sz="1800">
+                <a:latin typeface="맑은 고딕" charset="0"/>
+                <a:ea typeface="맑은 고딕" charset="0"/>
+              </a:rPr>
+              <a:t> Update( ) 함수에서 마우스</a:t>
+            </a:r>
+            <a:r>
+              <a:rPr lang="ko-KR" sz="1800">
+                <a:latin typeface="맑은 고딕" charset="0"/>
+                <a:ea typeface="맑은 고딕" charset="0"/>
+              </a:rPr>
+              <a:t> 입력 값을</a:t>
+            </a:r>
+            <a:r>
+              <a:rPr lang="ko-KR" sz="1800">
+                <a:latin typeface="맑은 고딕" charset="0"/>
+                <a:ea typeface="맑은 고딕" charset="0"/>
+              </a:rPr>
+              <a:t> </a:t>
+            </a:r>
+            <a:r>
+              <a:rPr lang="ko-KR" sz="1800">
+                <a:latin typeface="맑은 고딕" charset="0"/>
+                <a:ea typeface="맑은 고딕" charset="0"/>
+              </a:rPr>
+              <a:t>카메라의 </a:t>
+            </a:r>
+            <a:r>
+              <a:rPr lang="ko-KR" sz="1800">
+                <a:latin typeface="맑은 고딕" charset="0"/>
+                <a:ea typeface="맑은 고딕" charset="0"/>
+              </a:rPr>
+              <a:t>FieldOfView에</a:t>
+            </a:r>
+            <a:r>
+              <a:rPr lang="ko-KR" sz="1800">
+                <a:latin typeface="맑은 고딕" charset="0"/>
+                <a:ea typeface="맑은 고딕" charset="0"/>
+              </a:rPr>
+              <a:t> 적용될 수 있도록 설정합니다</a:t>
+            </a:r>
+            <a:r>
+              <a:rPr lang="ko-KR" sz="1800">
+                <a:latin typeface="맑은 고딕" charset="0"/>
+                <a:ea typeface="맑은 고딕" charset="0"/>
+              </a:rPr>
+              <a:t>.</a:t>
             </a:r>
             <a:endParaRPr lang="ko-KR" altLang="en-US" sz="1800">
               <a:latin typeface="맑은 고딕" charset="0"/>
               <a:ea typeface="맑은 고딕" charset="0"/>
             </a:endParaRPr>
           </a:p>
+        </p:txBody>
+      </p:sp>
+      <p:sp>
+        <p:nvSpPr>
+          <p:cNvPr id="39" name="텍스트 상자 53"/>
+          <p:cNvSpPr txBox="1">
+            <a:spLocks/>
+          </p:cNvSpPr>
+          <p:nvPr/>
+        </p:nvSpPr>
+        <p:spPr>
+          <a:xfrm rot="0">
+            <a:off x="1220470" y="3097530"/>
+            <a:ext cx="4125595" cy="677545"/>
+          </a:xfrm>
+          <a:prstGeom prst="rect"/>
+          <a:noFill/>
+          <a:ln w="0">
+            <a:noFill/>
+            <a:prstDash/>
+          </a:ln>
+        </p:spPr>
+        <p:txBody>
+          <a:bodyPr wrap="square" lIns="89535" tIns="46355" rIns="89535" bIns="46355" numCol="1" vert="horz" anchor="t">
+            <a:spAutoFit/>
+          </a:bodyPr>
+          <a:lstStyle/>
           <a:p>
             <a:pPr marL="0" indent="0" rtl="0" algn="l" defTabSz="914400" eaLnBrk="1" latinLnBrk="0" hangingPunct="1">
               <a:buFontTx/>
               <a:buNone/>
             </a:pPr>
+            <a:r>
+              <a:rPr lang="ko-KR" sz="2000" b="1">
+                <a:solidFill>
+                  <a:srgbClr val="0611F2"/>
+                </a:solidFill>
+                <a:latin typeface="맑은 고딕" charset="0"/>
+                <a:ea typeface="맑은 고딕" charset="0"/>
+              </a:rPr>
+              <a:t>3</a:t>
+            </a:r>
+            <a:r>
+              <a:rPr sz="2000" b="1">
+                <a:solidFill>
+                  <a:srgbClr val="0611F2"/>
+                </a:solidFill>
+                <a:latin typeface="맑은 고딕" charset="0"/>
+                <a:ea typeface="맑은 고딕" charset="0"/>
+              </a:rPr>
+              <a:t>. </a:t>
+            </a:r>
+            <a:r>
+              <a:rPr lang="ko-KR" sz="1800">
+                <a:latin typeface="맑은 고딕" charset="0"/>
+                <a:ea typeface="맑은 고딕" charset="0"/>
+              </a:rPr>
+              <a:t>그다음</a:t>
+            </a:r>
+            <a:r>
+              <a:rPr lang="ko-KR" sz="1800">
+                <a:latin typeface="맑은 고딕" charset="0"/>
+                <a:ea typeface="맑은 고딕" charset="0"/>
+              </a:rPr>
+              <a:t> Main</a:t>
+            </a:r>
+            <a:r>
+              <a:rPr lang="ko-KR" sz="1800">
+                <a:latin typeface="맑은 고딕" charset="0"/>
+                <a:ea typeface="맑은 고딕" charset="0"/>
+              </a:rPr>
+              <a:t> </a:t>
+            </a:r>
+            <a:r>
+              <a:rPr lang="ko-KR" sz="1800">
+                <a:latin typeface="맑은 고딕" charset="0"/>
+                <a:ea typeface="맑은 고딕" charset="0"/>
+              </a:rPr>
+              <a:t>Camera</a:t>
+            </a:r>
+            <a:r>
+              <a:rPr lang="ko-KR" sz="1800">
+                <a:latin typeface="맑은 고딕" charset="0"/>
+                <a:ea typeface="맑은 고딕" charset="0"/>
+              </a:rPr>
+              <a:t> 오브젝트의</a:t>
+            </a:r>
+            <a:r>
+              <a:rPr lang="ko-KR" sz="1800">
+                <a:latin typeface="맑은 고딕" charset="0"/>
+                <a:ea typeface="맑은 고딕" charset="0"/>
+              </a:rPr>
+              <a:t> </a:t>
+            </a:r>
+            <a:r>
+              <a:rPr lang="ko-KR" sz="1800">
+                <a:latin typeface="맑은 고딕" charset="0"/>
+                <a:ea typeface="맑은 고딕" charset="0"/>
+              </a:rPr>
+              <a:t>위치와</a:t>
+            </a:r>
+            <a:r>
+              <a:rPr lang="ko-KR" sz="1800">
+                <a:latin typeface="맑은 고딕" charset="0"/>
+                <a:ea typeface="맑은 고딕" charset="0"/>
+              </a:rPr>
+              <a:t> </a:t>
+            </a:r>
+            <a:r>
+              <a:rPr lang="ko-KR" sz="1800">
+                <a:latin typeface="맑은 고딕" charset="0"/>
+                <a:ea typeface="맑은 고딕" charset="0"/>
+              </a:rPr>
+              <a:t>회전</a:t>
+            </a:r>
+            <a:r>
+              <a:rPr lang="ko-KR" sz="1800">
+                <a:latin typeface="맑은 고딕" charset="0"/>
+                <a:ea typeface="맑은 고딕" charset="0"/>
+              </a:rPr>
+              <a:t> </a:t>
+            </a:r>
+            <a:r>
+              <a:rPr lang="ko-KR" sz="1800">
+                <a:latin typeface="맑은 고딕" charset="0"/>
+                <a:ea typeface="맑은 고딕" charset="0"/>
+              </a:rPr>
+              <a:t>값을</a:t>
+            </a:r>
+            <a:r>
+              <a:rPr lang="ko-KR" sz="1800">
+                <a:latin typeface="맑은 고딕" charset="0"/>
+                <a:ea typeface="맑은 고딕" charset="0"/>
+              </a:rPr>
+              <a:t> </a:t>
+            </a:r>
+            <a:r>
+              <a:rPr lang="ko-KR" sz="1800">
+                <a:latin typeface="맑은 고딕" charset="0"/>
+                <a:ea typeface="맑은 고딕" charset="0"/>
+              </a:rPr>
+              <a:t>설정합니다.</a:t>
+            </a:r>
             <a:endParaRPr lang="ko-KR" altLang="en-US" sz="1800">
               <a:latin typeface="맑은 고딕" charset="0"/>
               <a:ea typeface="맑은 고딕" charset="0"/>
             </a:endParaRPr>
           </a:p>
+        </p:txBody>
+      </p:sp>
+      <p:sp>
+        <p:nvSpPr>
+          <p:cNvPr id="43" name="텍스트 상자 11"/>
+          <p:cNvSpPr txBox="1">
+            <a:spLocks/>
+          </p:cNvSpPr>
+          <p:nvPr/>
+        </p:nvSpPr>
+        <p:spPr>
+          <a:xfrm rot="0">
+            <a:off x="1222375" y="5505450"/>
+            <a:ext cx="4140200" cy="677545"/>
+          </a:xfrm>
+          <a:prstGeom prst="rect"/>
+          <a:noFill/>
+          <a:ln w="0">
+            <a:noFill/>
+            <a:prstDash/>
+          </a:ln>
+        </p:spPr>
+        <p:txBody>
+          <a:bodyPr wrap="square" lIns="89535" tIns="46355" rIns="89535" bIns="46355" numCol="1" vert="horz" anchor="t">
+            <a:spAutoFit/>
+          </a:bodyPr>
+          <a:lstStyle/>
           <a:p>
             <a:pPr marL="0" indent="0" rtl="0" algn="l" defTabSz="914400" eaLnBrk="1" latinLnBrk="0" hangingPunct="1">
               <a:buFontTx/>
               <a:buNone/>
             </a:pPr>
             <a:r>
+              <a:rPr lang="ko-KR" sz="2000" b="1">
+                <a:solidFill>
+                  <a:srgbClr val="0611F2"/>
+                </a:solidFill>
+                <a:latin typeface="맑은 고딕" charset="0"/>
+                <a:ea typeface="맑은 고딕" charset="0"/>
+              </a:rPr>
+              <a:t>4</a:t>
+            </a:r>
+            <a:r>
+              <a:rPr sz="2000" b="1">
+                <a:solidFill>
+                  <a:srgbClr val="0611F2"/>
+                </a:solidFill>
+                <a:latin typeface="맑은 고딕" charset="0"/>
+                <a:ea typeface="맑은 고딕" charset="0"/>
+              </a:rPr>
+              <a:t>. </a:t>
+            </a:r>
+            <a:r>
               <a:rPr lang="ko-KR" sz="1800">
                 <a:latin typeface="맑은 고딕" charset="0"/>
                 <a:ea typeface="맑은 고딕" charset="0"/>
               </a:rPr>
-              <a:t>그다음 Update( ) 함수에서 마우스로 휠을 했을 때 변화되는 값을 distance 넣어주고 FieldOfView에 </a:t>
+              <a:t>그러고 나서</a:t>
             </a:r>
             <a:r>
               <a:rPr lang="ko-KR" sz="1800">
                 <a:latin typeface="맑은 고딕" charset="0"/>
                 <a:ea typeface="맑은 고딕" charset="0"/>
               </a:rPr>
-              <a:t>넣어줍니다.</a:t>
+              <a:t> </a:t>
+            </a:r>
+            <a:r>
+              <a:rPr lang="ko-KR" sz="1800">
+                <a:latin typeface="맑은 고딕" charset="0"/>
+                <a:ea typeface="맑은 고딕" charset="0"/>
+              </a:rPr>
+              <a:t>Ground 오브젝트의 위치와 회전 값을 초기화합니다.</a:t>
             </a:r>
             <a:endParaRPr lang="ko-KR" altLang="en-US" sz="1800">
               <a:latin typeface="맑은 고딕" charset="0"/>
@@ -6248,14 +6371,14 @@
       </p:sp>
       <p:pic>
         <p:nvPicPr>
-          <p:cNvPr id="38" name="그림 52" descr="C:/Users/Admin1/AppData/Roaming/PolarisOffice/ETemp/19428_13742608/fImage117002186500.png"/>
+          <p:cNvPr id="45" name="그림 16" descr="C:/Users/Admin1/AppData/Roaming/PolarisOffice/ETemp/16636_18866920/fImage122381159169.png"/>
           <p:cNvPicPr>
             <a:picLocks noChangeAspect="1"/>
           </p:cNvPicPr>
           <p:nvPr/>
         </p:nvPicPr>
         <p:blipFill rotWithShape="1">
-          <a:blip r:embed="rId19" cstate="print">
+          <a:blip r:embed="rId22" cstate="print">
             <a:extLst>
               <a:ext uri="{28A0092B-C50C-407E-A947-70E740481C1C}">
                 <a14:useLocalDpi xmlns:a14="http://schemas.microsoft.com/office/drawing/2010/main" val="0"/>
@@ -6268,8 +6391,8 @@
         </p:blipFill>
         <p:spPr>
           <a:xfrm rot="0">
-            <a:off x="1219200" y="1409700"/>
-            <a:ext cx="4134485" cy="1053465"/>
+            <a:off x="1210310" y="1437005"/>
+            <a:ext cx="4131945" cy="1535430"/>
           </a:xfrm>
           <a:prstGeom prst="roundRect"/>
           <a:solidFill>
@@ -6277,87 +6400,16 @@
           </a:solidFill>
         </p:spPr>
       </p:pic>
-      <p:sp>
-        <p:nvSpPr>
-          <p:cNvPr id="39" name="텍스트 상자 53"/>
-          <p:cNvSpPr txBox="1">
-            <a:spLocks/>
-          </p:cNvSpPr>
-          <p:nvPr/>
-        </p:nvSpPr>
-        <p:spPr>
-          <a:xfrm rot="0">
-            <a:off x="1228725" y="2533650"/>
-            <a:ext cx="4124960" cy="677545"/>
-          </a:xfrm>
-          <a:prstGeom prst="rect"/>
-          <a:noFill/>
-          <a:ln w="0">
-            <a:noFill/>
-            <a:prstDash/>
-          </a:ln>
-        </p:spPr>
-        <p:txBody>
-          <a:bodyPr wrap="square" lIns="89535" tIns="46355" rIns="89535" bIns="46355" numCol="1" vert="horz" anchor="t">
-            <a:spAutoFit/>
-          </a:bodyPr>
-          <a:lstStyle/>
-          <a:p>
-            <a:pPr marL="0" indent="0" rtl="0" algn="l" defTabSz="914400" eaLnBrk="1" latinLnBrk="0" hangingPunct="1">
-              <a:buFontTx/>
-              <a:buNone/>
-            </a:pPr>
-            <a:r>
-              <a:rPr lang="ko-KR" sz="2000" b="1">
-                <a:solidFill>
-                  <a:srgbClr val="0611F2"/>
-                </a:solidFill>
-                <a:latin typeface="맑은 고딕" charset="0"/>
-                <a:ea typeface="맑은 고딕" charset="0"/>
-              </a:rPr>
-              <a:t>4</a:t>
-            </a:r>
-            <a:r>
-              <a:rPr sz="2000" b="1">
-                <a:solidFill>
-                  <a:srgbClr val="0611F2"/>
-                </a:solidFill>
-                <a:latin typeface="맑은 고딕" charset="0"/>
-                <a:ea typeface="맑은 고딕" charset="0"/>
-              </a:rPr>
-              <a:t>. </a:t>
-            </a:r>
-            <a:r>
-              <a:rPr lang="ko-KR" sz="1800">
-                <a:latin typeface="맑은 고딕" charset="0"/>
-                <a:ea typeface="맑은 고딕" charset="0"/>
-              </a:rPr>
-              <a:t>그</a:t>
-            </a:r>
-            <a:r>
-              <a:rPr lang="ko-KR" sz="1800">
-                <a:latin typeface="맑은 고딕" charset="0"/>
-                <a:ea typeface="맑은 고딕" charset="0"/>
-              </a:rPr>
-              <a:t>리고 Floor 오브젝트의 위치와 회전 값을 설정합니다.</a:t>
-            </a:r>
-            <a:endParaRPr lang="ko-KR" altLang="en-US" sz="1800">
-              <a:latin typeface="맑은 고딕" charset="0"/>
-              <a:ea typeface="맑은 고딕" charset="0"/>
-            </a:endParaRPr>
-          </a:p>
-        </p:txBody>
-      </p:sp>
       <p:pic>
         <p:nvPicPr>
-          <p:cNvPr id="40" name="그림 54" descr="C:/Users/Admin1/AppData/Roaming/PolarisOffice/ETemp/19428_13742608/fImage133422209169.png"/>
+          <p:cNvPr id="46" name="그림 40" descr="C:/Users/Admin1/AppData/Roaming/PolarisOffice/ETemp/16636_18866920/fImage532781265724.png"/>
           <p:cNvPicPr>
             <a:picLocks noChangeAspect="1"/>
           </p:cNvPicPr>
           <p:nvPr/>
         </p:nvPicPr>
         <p:blipFill rotWithShape="1">
-          <a:blip r:embed="rId20" cstate="print">
+          <a:blip r:embed="rId23" cstate="print">
             <a:extLst>
               <a:ext uri="{28A0092B-C50C-407E-A947-70E740481C1C}">
                 <a14:useLocalDpi xmlns:a14="http://schemas.microsoft.com/office/drawing/2010/main" val="0"/>
@@ -6370,23 +6422,25 @@
         </p:blipFill>
         <p:spPr>
           <a:xfrm rot="0">
-            <a:off x="6829425" y="1414145"/>
-            <a:ext cx="4338955" cy="2787015"/>
-          </a:xfrm>
-          <a:prstGeom prst="rect"/>
-          <a:noFill/>
+            <a:off x="6819900" y="1438275"/>
+            <a:ext cx="4134485" cy="2781935"/>
+          </a:xfrm>
+          <a:prstGeom prst="roundRect"/>
+          <a:solidFill>
+            <a:srgbClr val="EDEDED"/>
+          </a:solidFill>
         </p:spPr>
       </p:pic>
       <p:pic>
         <p:nvPicPr>
-          <p:cNvPr id="41" name="그림 57" descr="C:/Users/Admin1/AppData/Roaming/PolarisOffice/ETemp/19428_13742608/fImage2322982235724.png"/>
+          <p:cNvPr id="47" name="그림 43" descr="C:/Users/Admin1/AppData/Roaming/PolarisOffice/ETemp/16636_18866920/fImage113691271478.png"/>
           <p:cNvPicPr>
             <a:picLocks noChangeAspect="1"/>
           </p:cNvPicPr>
           <p:nvPr/>
         </p:nvPicPr>
         <p:blipFill rotWithShape="1">
-          <a:blip r:embed="rId21" cstate="print">
+          <a:blip r:embed="rId24" cstate="print">
             <a:extLst>
               <a:ext uri="{28A0092B-C50C-407E-A947-70E740481C1C}">
                 <a14:useLocalDpi xmlns:a14="http://schemas.microsoft.com/office/drawing/2010/main" val="0"/>
@@ -6399,11 +6453,13 @@
         </p:blipFill>
         <p:spPr>
           <a:xfrm rot="0">
-            <a:off x="1219200" y="3429000"/>
-            <a:ext cx="4134485" cy="1343660"/>
-          </a:xfrm>
-          <a:prstGeom prst="rect"/>
-          <a:noFill/>
+            <a:off x="1219200" y="3914775"/>
+            <a:ext cx="4115435" cy="1486535"/>
+          </a:xfrm>
+          <a:prstGeom prst="roundRect"/>
+          <a:solidFill>
+            <a:srgbClr val="EDEDED"/>
+          </a:solidFill>
         </p:spPr>
       </p:pic>
     </p:spTree>
@@ -6457,7 +6513,7 @@
         <p:spPr>
           <a:xfrm rot="0">
             <a:off x="4462780" y="374650"/>
-            <a:ext cx="3209290" cy="554990"/>
+            <a:ext cx="3272155" cy="478155"/>
           </a:xfrm>
           <a:prstGeom prst="rect"/>
           <a:noFill/>
@@ -6472,33 +6528,33 @@
           </a:bodyPr>
           <a:lstStyle/>
           <a:p>
-            <a:pPr marL="0" indent="0" rtl="0" algn="l" defTabSz="914400" eaLnBrk="1" latinLnBrk="0" hangingPunct="1">
-              <a:buFontTx/>
-              <a:buNone/>
-            </a:pPr>
-            <a:r>
-              <a:rPr lang="ko-KR" sz="3000" b="1">
+            <a:pPr marL="0" indent="0" rtl="0" algn="ctr" defTabSz="914400" eaLnBrk="1" latinLnBrk="0" hangingPunct="1">
+              <a:buFontTx/>
+              <a:buNone/>
+            </a:pPr>
+            <a:r>
+              <a:rPr lang="ko-KR" sz="2500" b="1">
                 <a:solidFill>
                   <a:schemeClr val="tx1"/>
                 </a:solidFill>
-                <a:latin typeface="맑은 고딕" charset="0"/>
-                <a:ea typeface="맑은 고딕" charset="0"/>
+                <a:latin typeface="나눔바른고딕" charset="0"/>
+                <a:ea typeface="나눔바른고딕" charset="0"/>
               </a:rPr>
               <a:t>세 번째 튜토리얼</a:t>
             </a:r>
-            <a:endParaRPr lang="ko-KR" altLang="en-US" sz="3000" b="1">
+            <a:endParaRPr lang="ko-KR" altLang="en-US" sz="2500" b="1">
               <a:solidFill>
                 <a:schemeClr val="tx1"/>
               </a:solidFill>
-              <a:latin typeface="맑은 고딕" charset="0"/>
-              <a:ea typeface="맑은 고딕" charset="0"/>
+              <a:latin typeface="나눔바른고딕" charset="0"/>
+              <a:ea typeface="나눔바른고딕" charset="0"/>
             </a:endParaRPr>
           </a:p>
         </p:txBody>
       </p:sp>
       <p:pic>
         <p:nvPicPr>
-          <p:cNvPr id="15" name="그림 52" descr="C:/Users/Admin1/AppData/Roaming/PolarisOffice/ETemp/19428_13742608/fImage159531854827.png"/>
+          <p:cNvPr id="15" name="그림 52" descr="C:/Users/Admin1/AppData/Roaming/PolarisOffice/ETemp/16636_18866920/fImage159531854827.png"/>
           <p:cNvPicPr>
             <a:picLocks noChangeAspect="1"/>
           </p:cNvPicPr>
@@ -6518,8 +6574,8 @@
         </p:blipFill>
         <p:spPr>
           <a:xfrm rot="0">
-            <a:off x="1035685" y="1381125"/>
-            <a:ext cx="2708275" cy="4020185"/>
+            <a:off x="1228725" y="1457325"/>
+            <a:ext cx="2648585" cy="3305810"/>
           </a:xfrm>
           <a:prstGeom prst="roundRect"/>
           <a:solidFill>
@@ -6537,8 +6593,8 @@
         </p:nvSpPr>
         <p:spPr>
           <a:xfrm rot="0">
-            <a:off x="1040765" y="5528945"/>
-            <a:ext cx="4312920" cy="677545"/>
+            <a:off x="1228725" y="4909820"/>
+            <a:ext cx="4163060" cy="1231265"/>
           </a:xfrm>
           <a:prstGeom prst="rect"/>
           <a:noFill/>
@@ -6582,14 +6638,42 @@
                 <a:latin typeface="맑은 고딕" charset="0"/>
                 <a:ea typeface="맑은 고딕" charset="0"/>
               </a:rPr>
-              <a:t>이제 </a:t>
+              <a:t>그런 다음</a:t>
             </a:r>
             <a:r>
               <a:rPr lang="ko-KR" sz="1800">
                 <a:latin typeface="맑은 고딕" charset="0"/>
                 <a:ea typeface="맑은 고딕" charset="0"/>
               </a:rPr>
-              <a:t>3D Object에 Plane 3개를 생성하고 각각의 이름을 정의합니다.</a:t>
+              <a:t> 3D Object에 Plane</a:t>
+            </a:r>
+            <a:r>
+              <a:rPr lang="ko-KR" sz="1800">
+                <a:latin typeface="맑은 고딕" charset="0"/>
+                <a:ea typeface="맑은 고딕" charset="0"/>
+              </a:rPr>
+              <a:t>을 2개</a:t>
+            </a:r>
+            <a:r>
+              <a:rPr lang="ko-KR" sz="1800">
+                <a:latin typeface="맑은 고딕" charset="0"/>
+                <a:ea typeface="맑은 고딕" charset="0"/>
+              </a:rPr>
+              <a:t> 생성하고 </a:t>
+            </a:r>
+            <a:r>
+              <a:rPr lang="ko-KR" sz="1800">
+                <a:latin typeface="맑은 고딕" charset="0"/>
+                <a:ea typeface="맑은 고딕" charset="0"/>
+              </a:rPr>
+              <a:t>Left Wall 이라는 이름과 Right Wall 이라는 이름으로</a:t>
+            </a:r>
+            <a:r>
+              <a:rPr lang="ko-KR" sz="1800">
+                <a:latin typeface="맑은 고딕" charset="0"/>
+                <a:ea typeface="맑은 고딕" charset="0"/>
+              </a:rPr>
+              <a:t> 정의합니다.</a:t>
             </a:r>
             <a:endParaRPr lang="ko-KR" altLang="en-US" sz="1800">
               <a:latin typeface="맑은 고딕" charset="0"/>
@@ -6600,14 +6684,14 @@
       </p:sp>
       <p:pic>
         <p:nvPicPr>
-          <p:cNvPr id="22" name="그림 41" descr="C:/Users/Admin1/AppData/Roaming/PolarisOffice/ETemp/19428_13742608/fImage56142131478.png"/>
+          <p:cNvPr id="28" name="그림 46" descr="C:/Users/Admin1/AppData/Roaming/PolarisOffice/ETemp/16636_18866920/fImage66531289358.png"/>
           <p:cNvPicPr>
             <a:picLocks noChangeAspect="1"/>
           </p:cNvPicPr>
           <p:nvPr/>
         </p:nvPicPr>
         <p:blipFill rotWithShape="1">
-          <a:blip r:embed="rId7" cstate="print">
+          <a:blip r:embed="rId11" cstate="print">
             <a:extLst>
               <a:ext uri="{28A0092B-C50C-407E-A947-70E740481C1C}">
                 <a14:useLocalDpi xmlns:a14="http://schemas.microsoft.com/office/drawing/2010/main" val="0"/>
@@ -6620,8 +6704,8 @@
         </p:blipFill>
         <p:spPr>
           <a:xfrm rot="0">
-            <a:off x="8246745" y="1384935"/>
-            <a:ext cx="2947035" cy="949325"/>
+            <a:off x="4076700" y="2181225"/>
+            <a:ext cx="1305560" cy="1858010"/>
           </a:xfrm>
           <a:prstGeom prst="roundRect"/>
           <a:solidFill>
@@ -6629,141 +6713,16 @@
           </a:solidFill>
         </p:spPr>
       </p:pic>
-      <p:sp>
-        <p:nvSpPr>
-          <p:cNvPr id="24" name="텍스트 상자 47"/>
-          <p:cNvSpPr txBox="1">
-            <a:spLocks/>
-          </p:cNvSpPr>
-          <p:nvPr/>
-        </p:nvSpPr>
-        <p:spPr>
-          <a:xfrm rot="0">
-            <a:off x="6829425" y="3592830"/>
-            <a:ext cx="4370070" cy="2615565"/>
-          </a:xfrm>
-          <a:prstGeom prst="rect"/>
-          <a:noFill/>
-          <a:ln w="0">
-            <a:noFill/>
-            <a:prstDash/>
-          </a:ln>
-        </p:spPr>
-        <p:txBody>
-          <a:bodyPr wrap="square" lIns="89535" tIns="46355" rIns="89535" bIns="46355" numCol="1" vert="horz" anchor="t">
-            <a:spAutoFit/>
-          </a:bodyPr>
-          <a:lstStyle/>
-          <a:p>
-            <a:pPr marL="0" indent="0" rtl="0" algn="l" defTabSz="914400" eaLnBrk="1" latinLnBrk="0" hangingPunct="1">
-              <a:buFontTx/>
-              <a:buNone/>
-            </a:pPr>
-            <a:r>
-              <a:rPr lang="ko-KR" sz="2000" b="1">
-                <a:solidFill>
-                  <a:srgbClr val="0611F2"/>
-                </a:solidFill>
-                <a:latin typeface="맑은 고딕" charset="0"/>
-                <a:ea typeface="맑은 고딕" charset="0"/>
-              </a:rPr>
-              <a:t>7</a:t>
-            </a:r>
-            <a:r>
-              <a:rPr sz="2000" b="1">
-                <a:solidFill>
-                  <a:srgbClr val="0611F2"/>
-                </a:solidFill>
-                <a:latin typeface="맑은 고딕" charset="0"/>
-                <a:ea typeface="맑은 고딕" charset="0"/>
-              </a:rPr>
-              <a:t>. </a:t>
-            </a:r>
-            <a:r>
-              <a:rPr lang="ko-KR" sz="1800">
-                <a:latin typeface="맑은 고딕" charset="0"/>
-                <a:ea typeface="맑은 고딕" charset="0"/>
-              </a:rPr>
-              <a:t>그런 다음 </a:t>
-            </a:r>
-            <a:r>
-              <a:rPr lang="ko-KR" sz="1800">
-                <a:latin typeface="맑은 고딕" charset="0"/>
-                <a:ea typeface="맑은 고딕" charset="0"/>
-              </a:rPr>
-              <a:t>Project 폴더에 있는 Prefab 폴더에 Particle System 오브젝트를 선택합니다.</a:t>
-            </a:r>
-            <a:endParaRPr lang="ko-KR" altLang="en-US" sz="1800">
-              <a:latin typeface="맑은 고딕" charset="0"/>
-              <a:ea typeface="맑은 고딕" charset="0"/>
-            </a:endParaRPr>
-          </a:p>
-          <a:p>
-            <a:pPr marL="0" indent="0" rtl="0" algn="l" defTabSz="914400" eaLnBrk="1" latinLnBrk="0" hangingPunct="1">
-              <a:buFontTx/>
-              <a:buNone/>
-            </a:pPr>
-            <a:endParaRPr lang="ko-KR" altLang="en-US" sz="1800">
-              <a:latin typeface="맑은 고딕" charset="0"/>
-              <a:ea typeface="맑은 고딕" charset="0"/>
-            </a:endParaRPr>
-          </a:p>
-          <a:p>
-            <a:pPr marL="0" indent="0" rtl="0" algn="l" defTabSz="914400" eaLnBrk="1" latinLnBrk="0" hangingPunct="1">
-              <a:buFontTx/>
-              <a:buNone/>
-            </a:pPr>
-            <a:r>
-              <a:rPr lang="ko-KR" sz="1800">
-                <a:latin typeface="맑은 고딕" charset="0"/>
-                <a:ea typeface="맑은 고딕" charset="0"/>
-              </a:rPr>
-              <a:t>그다음으로 Box 오브젝트의 하위 오브젝트에 넣어줍니다.</a:t>
-            </a:r>
-            <a:endParaRPr lang="ko-KR" altLang="en-US" sz="1800">
-              <a:latin typeface="맑은 고딕" charset="0"/>
-              <a:ea typeface="맑은 고딕" charset="0"/>
-            </a:endParaRPr>
-          </a:p>
-          <a:p>
-            <a:pPr marL="0" indent="0" rtl="0" algn="l" defTabSz="914400" eaLnBrk="1" latinLnBrk="0" hangingPunct="1">
-              <a:buFontTx/>
-              <a:buNone/>
-            </a:pPr>
-            <a:endParaRPr lang="ko-KR" altLang="en-US" sz="1800">
-              <a:latin typeface="맑은 고딕" charset="0"/>
-              <a:ea typeface="맑은 고딕" charset="0"/>
-            </a:endParaRPr>
-          </a:p>
-          <a:p>
-            <a:pPr marL="0" indent="0" rtl="0" algn="l" defTabSz="914400" eaLnBrk="1" latinLnBrk="0" hangingPunct="1">
-              <a:buFontTx/>
-              <a:buNone/>
-            </a:pPr>
-            <a:r>
-              <a:rPr lang="ko-KR" sz="1800">
-                <a:latin typeface="맑은 고딕" charset="0"/>
-                <a:ea typeface="맑은 고딕" charset="0"/>
-              </a:rPr>
-              <a:t>그리고 Particle System의 위치와 회전 값을 설정합니다.</a:t>
-            </a:r>
-            <a:endParaRPr lang="ko-KR" altLang="en-US" sz="1800">
-              <a:latin typeface="맑은 고딕" charset="0"/>
-              <a:ea typeface="맑은 고딕" charset="0"/>
-            </a:endParaRPr>
-          </a:p>
-        </p:txBody>
-      </p:sp>
       <p:pic>
         <p:nvPicPr>
-          <p:cNvPr id="25" name="그림 48" descr="C:/Users/Admin1/AppData/Roaming/PolarisOffice/ETemp/19428_13742608/fImage81572169358.png"/>
+          <p:cNvPr id="29" name="그림 49" descr="C:/Users/Admin1/AppData/Roaming/PolarisOffice/ETemp/16636_18866920/fImage65961296962.png"/>
           <p:cNvPicPr>
             <a:picLocks noChangeAspect="1"/>
           </p:cNvPicPr>
           <p:nvPr/>
         </p:nvPicPr>
         <p:blipFill rotWithShape="1">
-          <a:blip r:embed="rId8" cstate="print">
+          <a:blip r:embed="rId12" cstate="print">
             <a:extLst>
               <a:ext uri="{28A0092B-C50C-407E-A947-70E740481C1C}">
                 <a14:useLocalDpi xmlns:a14="http://schemas.microsoft.com/office/drawing/2010/main" val="0"/>
@@ -6776,8 +6735,8 @@
         </p:blipFill>
         <p:spPr>
           <a:xfrm rot="0">
-            <a:off x="6829425" y="1384935"/>
-            <a:ext cx="1343025" cy="955675"/>
+            <a:off x="6819900" y="1461770"/>
+            <a:ext cx="1429385" cy="1272540"/>
           </a:xfrm>
           <a:prstGeom prst="roundRect"/>
           <a:solidFill>
@@ -6785,49 +6744,16 @@
           </a:solidFill>
         </p:spPr>
       </p:pic>
-      <p:cxnSp>
-        <p:nvCxnSpPr>
-          <p:cNvPr id="23" name="도형 46"/>
-          <p:cNvCxnSpPr/>
-          <p:nvPr/>
-        </p:nvCxnSpPr>
-        <p:spPr>
-          <a:xfrm rot="0" flipH="1">
-            <a:off x="7404735" y="1800225"/>
-            <a:ext cx="968375" cy="4445"/>
-          </a:xfrm>
-          <a:prstGeom prst="straightConnector1"/>
-          <a:ln w="6350" cap="flat" cmpd="sng">
-            <a:prstDash/>
-            <a:headEnd type="none" w="med" len="med"/>
-            <a:tailEnd type="triangle" w="med" len="med"/>
-          </a:ln>
-        </p:spPr>
-        <p:style>
-          <a:lnRef idx="1">
-            <a:schemeClr val="accent1"/>
-          </a:lnRef>
-          <a:fillRef idx="0">
-            <a:schemeClr val="accent1"/>
-          </a:fillRef>
-          <a:effectRef idx="0">
-            <a:schemeClr val="accent1"/>
-          </a:effectRef>
-          <a:fontRef idx="minor">
-            <a:schemeClr val="tx1"/>
-          </a:fontRef>
-        </p:style>
-      </p:cxnSp>
       <p:pic>
         <p:nvPicPr>
-          <p:cNvPr id="26" name="그림 58" descr="C:/Users/Admin1/AppData/Roaming/PolarisOffice/ETemp/19428_13742608/fImage82102246962.png"/>
+          <p:cNvPr id="30" name="그림 52" descr="C:/Users/Admin1/AppData/Roaming/PolarisOffice/ETemp/16636_18866920/fImage145361304464.png"/>
           <p:cNvPicPr>
             <a:picLocks noChangeAspect="1"/>
           </p:cNvPicPr>
           <p:nvPr/>
         </p:nvPicPr>
         <p:blipFill rotWithShape="1">
-          <a:blip r:embed="rId9" cstate="print">
+          <a:blip r:embed="rId13" cstate="print">
             <a:extLst>
               <a:ext uri="{28A0092B-C50C-407E-A947-70E740481C1C}">
                 <a14:useLocalDpi xmlns:a14="http://schemas.microsoft.com/office/drawing/2010/main" val="0"/>
@@ -6840,8 +6766,8 @@
         </p:blipFill>
         <p:spPr>
           <a:xfrm rot="0">
-            <a:off x="3943350" y="2143125"/>
-            <a:ext cx="1400810" cy="2486660"/>
+            <a:off x="8382000" y="1447800"/>
+            <a:ext cx="2572385" cy="1276985"/>
           </a:xfrm>
           <a:prstGeom prst="roundRect"/>
           <a:solidFill>
@@ -6849,37 +6775,138 @@
           </a:solidFill>
         </p:spPr>
       </p:pic>
-      <p:pic>
-        <p:nvPicPr>
-          <p:cNvPr id="27" name="그림 61" descr="C:/Users/Admin1/AppData/Roaming/PolarisOffice/ETemp/19428_13742608/fImage169392254464.png"/>
-          <p:cNvPicPr>
-            <a:picLocks noChangeAspect="1"/>
-          </p:cNvPicPr>
+      <p:sp>
+        <p:nvSpPr>
+          <p:cNvPr id="31" name="텍스트 상자 55"/>
+          <p:cNvSpPr txBox="1">
+            <a:spLocks/>
+          </p:cNvSpPr>
           <p:nvPr/>
-        </p:nvPicPr>
-        <p:blipFill rotWithShape="1">
-          <a:blip r:embed="rId10" cstate="print">
-            <a:extLst>
-              <a:ext uri="{28A0092B-C50C-407E-A947-70E740481C1C}">
-                <a14:useLocalDpi xmlns:a14="http://schemas.microsoft.com/office/drawing/2010/main" val="0"/>
-              </a:ext>
-            </a:extLst>
-          </a:blip>
-          <a:stretch>
-            <a:fillRect/>
-          </a:stretch>
-        </p:blipFill>
-        <p:spPr>
-          <a:xfrm rot="0">
-            <a:off x="6838950" y="2524125"/>
-            <a:ext cx="4358005" cy="972185"/>
-          </a:xfrm>
-          <a:prstGeom prst="roundRect"/>
-          <a:solidFill>
-            <a:srgbClr val="EDEDED"/>
-          </a:solidFill>
-        </p:spPr>
-      </p:pic>
+        </p:nvSpPr>
+        <p:spPr>
+          <a:xfrm rot="0">
+            <a:off x="6825615" y="2846705"/>
+            <a:ext cx="4128770" cy="1231265"/>
+          </a:xfrm>
+          <a:prstGeom prst="rect"/>
+          <a:noFill/>
+          <a:ln w="0">
+            <a:noFill/>
+            <a:prstDash/>
+          </a:ln>
+        </p:spPr>
+        <p:txBody>
+          <a:bodyPr wrap="square" lIns="89535" tIns="46355" rIns="89535" bIns="46355" numCol="1" vert="horz" anchor="t">
+            <a:spAutoFit/>
+          </a:bodyPr>
+          <a:lstStyle/>
+          <a:p>
+            <a:pPr marL="0" indent="0" rtl="0" algn="l" defTabSz="914400" eaLnBrk="1" latinLnBrk="0" hangingPunct="1">
+              <a:buFontTx/>
+              <a:buNone/>
+            </a:pPr>
+            <a:r>
+              <a:rPr lang="ko-KR" sz="2000" b="1">
+                <a:solidFill>
+                  <a:srgbClr val="0611F2"/>
+                </a:solidFill>
+                <a:latin typeface="맑은 고딕" charset="0"/>
+                <a:ea typeface="맑은 고딕" charset="0"/>
+              </a:rPr>
+              <a:t>7</a:t>
+            </a:r>
+            <a:r>
+              <a:rPr lang="ko-KR" sz="2000" b="1">
+                <a:solidFill>
+                  <a:srgbClr val="0611F2"/>
+                </a:solidFill>
+                <a:latin typeface="맑은 고딕" charset="0"/>
+                <a:ea typeface="맑은 고딕" charset="0"/>
+              </a:rPr>
+              <a:t>.</a:t>
+            </a:r>
+            <a:r>
+              <a:rPr sz="2000" b="1">
+                <a:solidFill>
+                  <a:srgbClr val="0611F2"/>
+                </a:solidFill>
+                <a:latin typeface="맑은 고딕" charset="0"/>
+                <a:ea typeface="맑은 고딕" charset="0"/>
+              </a:rPr>
+              <a:t> </a:t>
+            </a:r>
+            <a:r>
+              <a:rPr lang="ko-KR" sz="1800">
+                <a:latin typeface="맑은 고딕" charset="0"/>
+                <a:ea typeface="맑은 고딕" charset="0"/>
+              </a:rPr>
+              <a:t>그다음</a:t>
+            </a:r>
+            <a:r>
+              <a:rPr lang="ko-KR" sz="1800">
+                <a:latin typeface="맑은 고딕" charset="0"/>
+                <a:ea typeface="맑은 고딕" charset="0"/>
+              </a:rPr>
+              <a:t> Project 폴더</a:t>
+            </a:r>
+            <a:r>
+              <a:rPr lang="ko-KR" sz="1800">
+                <a:latin typeface="맑은 고딕" charset="0"/>
+                <a:ea typeface="맑은 고딕" charset="0"/>
+              </a:rPr>
+              <a:t> 아래에 있는</a:t>
+            </a:r>
+            <a:r>
+              <a:rPr lang="ko-KR" sz="1800">
+                <a:latin typeface="맑은 고딕" charset="0"/>
+                <a:ea typeface="맑은 고딕" charset="0"/>
+              </a:rPr>
+              <a:t> </a:t>
+            </a:r>
+            <a:r>
+              <a:rPr lang="ko-KR" sz="1800">
+                <a:latin typeface="맑은 고딕" charset="0"/>
+                <a:ea typeface="맑은 고딕" charset="0"/>
+              </a:rPr>
+              <a:t>Textures 폴더에 Physical Box Texture </a:t>
+            </a:r>
+            <a:r>
+              <a:rPr lang="ko-KR" sz="1800" b="0">
+                <a:solidFill>
+                  <a:schemeClr val="tx1"/>
+                </a:solidFill>
+                <a:latin typeface="맑은 고딕" charset="0"/>
+                <a:ea typeface="맑은 고딕" charset="0"/>
+              </a:rPr>
+              <a:t>텍스처를 선택하고 </a:t>
+            </a:r>
+            <a:r>
+              <a:rPr lang="ko-KR" sz="1800">
+                <a:latin typeface="맑은 고딕" charset="0"/>
+                <a:ea typeface="맑은 고딕" charset="0"/>
+              </a:rPr>
+              <a:t>Physical Box </a:t>
+            </a:r>
+            <a:r>
+              <a:rPr lang="ko-KR" sz="1800" b="0">
+                <a:solidFill>
+                  <a:schemeClr val="tx1"/>
+                </a:solidFill>
+                <a:latin typeface="맑은 고딕" charset="0"/>
+                <a:ea typeface="맑은 고딕" charset="0"/>
+              </a:rPr>
+              <a:t>오브젝트에 넣어줍니다.</a:t>
+            </a:r>
+            <a:endParaRPr lang="ko-KR" altLang="en-US" sz="1800" b="0">
+              <a:solidFill>
+                <a:schemeClr val="tx1"/>
+              </a:solidFill>
+              <a:latin typeface="맑은 고딕" charset="0"/>
+              <a:ea typeface="맑은 고딕" charset="0"/>
+            </a:endParaRPr>
+          </a:p>
+        </p:txBody>
+      </p:sp>
     </p:spTree>
   </p:cSld>
   <p:clrMapOvr>
@@ -6929,9 +6956,9 @@
           <p:nvPr/>
         </p:nvSpPr>
         <p:spPr>
-          <a:xfrm>
+          <a:xfrm rot="0">
             <a:off x="4516755" y="383540"/>
-            <a:ext cx="3168015" cy="554990"/>
+            <a:ext cx="3168650" cy="478155"/>
           </a:xfrm>
           <a:prstGeom prst="rect"/>
           <a:noFill/>
@@ -6946,36 +6973,26 @@
           </a:bodyPr>
           <a:lstStyle/>
           <a:p>
-            <a:pPr marL="0" indent="0" rtl="0" algn="l" defTabSz="914400" eaLnBrk="1" latinLnBrk="0" hangingPunct="1">
-              <a:buFontTx/>
-              <a:buNone/>
-            </a:pPr>
-            <a:r>
-              <a:rPr lang="ko-KR" sz="3000" b="1">
+            <a:pPr marL="0" indent="0" rtl="0" algn="ctr" defTabSz="914400" eaLnBrk="1" latinLnBrk="0" hangingPunct="1">
+              <a:buFontTx/>
+              <a:buNone/>
+            </a:pPr>
+            <a:r>
+              <a:rPr lang="ko-KR" sz="2500" b="1">
                 <a:solidFill>
                   <a:schemeClr val="tx1"/>
                 </a:solidFill>
-                <a:latin typeface="맑은 고딕" charset="0"/>
-                <a:ea typeface="맑은 고딕" charset="0"/>
-              </a:rPr>
-              <a:t>네</a:t>
-            </a:r>
-            <a:r>
-              <a:rPr lang="ko-KR" sz="3000" b="1">
-                <a:solidFill>
-                  <a:schemeClr val="tx1"/>
-                </a:solidFill>
-                <a:latin typeface="맑은 고딕" charset="0"/>
-                <a:ea typeface="맑은 고딕" charset="0"/>
-              </a:rPr>
-              <a:t> 번째 튜토리얼</a:t>
-            </a:r>
-            <a:endParaRPr lang="ko-KR" altLang="en-US" sz="3000" b="1">
+                <a:latin typeface="나눔바른고딕" charset="0"/>
+                <a:ea typeface="나눔바른고딕" charset="0"/>
+              </a:rPr>
+              <a:t>네 번째 튜토리얼</a:t>
+            </a:r>
+            <a:endParaRPr lang="ko-KR" altLang="en-US" sz="2500" b="1">
               <a:solidFill>
                 <a:schemeClr val="tx1"/>
               </a:solidFill>
-              <a:latin typeface="맑은 고딕" charset="0"/>
-              <a:ea typeface="맑은 고딕" charset="0"/>
+              <a:latin typeface="나눔바른고딕" charset="0"/>
+              <a:ea typeface="나눔바른고딕" charset="0"/>
             </a:endParaRPr>
           </a:p>
         </p:txBody>
@@ -6990,8 +7007,8 @@
         </p:nvSpPr>
         <p:spPr>
           <a:xfrm rot="0">
-            <a:off x="1423670" y="5160010"/>
-            <a:ext cx="3943350" cy="954405"/>
+            <a:off x="1228090" y="5160010"/>
+            <a:ext cx="4144645" cy="954405"/>
           </a:xfrm>
           <a:prstGeom prst="rect"/>
           <a:noFill/>
@@ -7018,7 +7035,7 @@
                 <a:latin typeface="맑은 고딕" charset="0"/>
                 <a:ea typeface="맑은 고딕" charset="0"/>
               </a:rPr>
-              <a:t>8</a:t>
+              <a:t>9</a:t>
             </a:r>
             <a:r>
               <a:rPr sz="2000" b="1">
@@ -7035,35 +7052,14 @@
                 <a:latin typeface="맑은 고딕" charset="0"/>
                 <a:ea typeface="맑은 고딕" charset="0"/>
               </a:rPr>
-              <a:t>그리고 </a:t>
+              <a:t>이제</a:t>
             </a:r>
             <a:r>
               <a:rPr lang="ko-KR" sz="1800">
                 <a:latin typeface="맑은 고딕" charset="0"/>
                 <a:ea typeface="맑은 고딕" charset="0"/>
               </a:rPr>
-              <a:t>Left Wall</a:t>
-            </a:r>
-            <a:r>
-              <a:rPr lang="ko-KR" sz="1800">
-                <a:latin typeface="맑은 고딕" charset="0"/>
-                <a:ea typeface="맑은 고딕" charset="0"/>
-              </a:rPr>
-              <a:t> 오브젝트</a:t>
-            </a:r>
-            <a:r>
-              <a:rPr lang="ko-KR" sz="1800">
-                <a:latin typeface="맑은 고딕" charset="0"/>
-                <a:ea typeface="맑은 고딕" charset="0"/>
-              </a:rPr>
-              <a:t>와 Right Wall 오브젝트의</a:t>
-            </a:r>
-            <a:r>
-              <a:rPr lang="ko-KR" sz="1800">
-                <a:latin typeface="맑은 고딕" charset="0"/>
-                <a:ea typeface="맑은 고딕" charset="0"/>
-              </a:rPr>
-              <a:t> 위치와 회전 값을 설정합니다.</a:t>
+              <a:t> Left Wall 오브젝트와 Right Wall 오브젝트의 위치와 회전 값을 설정합니다.</a:t>
             </a:r>
             <a:endParaRPr lang="ko-KR" altLang="en-US" sz="1800">
               <a:latin typeface="맑은 고딕" charset="0"/>
@@ -7072,251 +7068,16 @@
           </a:p>
         </p:txBody>
       </p:sp>
-      <p:sp>
-        <p:nvSpPr>
-          <p:cNvPr id="37" name="Rect 0"/>
-          <p:cNvSpPr txBox="1">
-            <a:spLocks/>
-          </p:cNvSpPr>
-          <p:nvPr/>
-        </p:nvSpPr>
-        <p:spPr>
-          <a:xfrm rot="0">
-            <a:off x="6787515" y="4332605"/>
-            <a:ext cx="4273550" cy="1784985"/>
-          </a:xfrm>
-          <a:prstGeom prst="rect"/>
-          <a:noFill/>
-          <a:ln w="0">
-            <a:noFill/>
-            <a:prstDash/>
-          </a:ln>
-        </p:spPr>
-        <p:txBody>
-          <a:bodyPr wrap="square" lIns="89535" tIns="46355" rIns="89535" bIns="46355" numCol="1" vert="horz" anchor="t">
-            <a:spAutoFit/>
-          </a:bodyPr>
-          <a:lstStyle/>
-          <a:p>
-            <a:pPr marL="0" indent="0" rtl="0" algn="l" defTabSz="914400" eaLnBrk="1" latinLnBrk="0" hangingPunct="1">
-              <a:buFontTx/>
-              <a:buNone/>
-            </a:pPr>
-            <a:r>
-              <a:rPr lang="ko-KR" sz="2000" b="1">
-                <a:solidFill>
-                  <a:srgbClr val="0611F2"/>
-                </a:solidFill>
-                <a:latin typeface="맑은 고딕" charset="0"/>
-                <a:ea typeface="맑은 고딕" charset="0"/>
-              </a:rPr>
-              <a:t>9.</a:t>
-            </a:r>
-            <a:r>
-              <a:rPr sz="2000" b="1">
-                <a:solidFill>
-                  <a:srgbClr val="0611F2"/>
-                </a:solidFill>
-                <a:latin typeface="맑은 고딕" charset="0"/>
-                <a:ea typeface="맑은 고딕" charset="0"/>
-              </a:rPr>
-              <a:t> </a:t>
-            </a:r>
-            <a:r>
-              <a:rPr lang="ko-KR" sz="1800">
-                <a:latin typeface="맑은 고딕" charset="0"/>
-                <a:ea typeface="맑은 고딕" charset="0"/>
-              </a:rPr>
-              <a:t>이제 Project 폴더에 가서 Mouse Drag의 하위 폴더에 Textures를 선택합니다. </a:t>
-            </a:r>
-            <a:endParaRPr lang="ko-KR" altLang="en-US" sz="1800">
-              <a:latin typeface="맑은 고딕" charset="0"/>
-              <a:ea typeface="맑은 고딕" charset="0"/>
-            </a:endParaRPr>
-          </a:p>
-          <a:p>
-            <a:pPr marL="0" indent="0" rtl="0" algn="l" defTabSz="914400" eaLnBrk="1" latinLnBrk="0" hangingPunct="1">
-              <a:buFontTx/>
-              <a:buNone/>
-            </a:pPr>
-            <a:endParaRPr lang="ko-KR" altLang="en-US" sz="1800">
-              <a:latin typeface="맑은 고딕" charset="0"/>
-              <a:ea typeface="맑은 고딕" charset="0"/>
-            </a:endParaRPr>
-          </a:p>
-          <a:p>
-            <a:pPr marL="0" indent="0" rtl="0" algn="l" defTabSz="914400" eaLnBrk="1" latinLnBrk="0" hangingPunct="1">
-              <a:buFontTx/>
-              <a:buNone/>
-            </a:pPr>
-            <a:r>
-              <a:rPr lang="ko-KR" sz="1800">
-                <a:latin typeface="맑은 고딕" charset="0"/>
-                <a:ea typeface="맑은 고딕" charset="0"/>
-              </a:rPr>
-              <a:t>그다음 </a:t>
-            </a:r>
-            <a:r>
-              <a:rPr lang="ko-KR" sz="1800" b="0">
-                <a:solidFill>
-                  <a:schemeClr val="tx1"/>
-                </a:solidFill>
-                <a:latin typeface="맑은 고딕" charset="0"/>
-                <a:ea typeface="맑은 고딕" charset="0"/>
-              </a:rPr>
-              <a:t>1panel_braced_J</a:t>
-            </a:r>
-            <a:r>
-              <a:rPr lang="ko-KR" sz="1800" b="0">
-                <a:solidFill>
-                  <a:schemeClr val="tx1"/>
-                </a:solidFill>
-                <a:latin typeface="맑은 고딕" charset="0"/>
-                <a:ea typeface="맑은 고딕" charset="0"/>
-              </a:rPr>
-              <a:t> </a:t>
-            </a:r>
-            <a:r>
-              <a:rPr lang="ko-KR" sz="1800" b="0">
-                <a:solidFill>
-                  <a:schemeClr val="tx1"/>
-                </a:solidFill>
-                <a:latin typeface="맑은 고딕" charset="0"/>
-                <a:ea typeface="맑은 고딕" charset="0"/>
-              </a:rPr>
-              <a:t>텍스처를</a:t>
-            </a:r>
-            <a:r>
-              <a:rPr lang="ko-KR" sz="1800" b="0">
-                <a:solidFill>
-                  <a:schemeClr val="tx1"/>
-                </a:solidFill>
-                <a:latin typeface="맑은 고딕" charset="0"/>
-                <a:ea typeface="맑은 고딕" charset="0"/>
-              </a:rPr>
-              <a:t> </a:t>
-            </a:r>
-            <a:r>
-              <a:rPr lang="ko-KR" sz="1800" b="0">
-                <a:solidFill>
-                  <a:schemeClr val="tx1"/>
-                </a:solidFill>
-                <a:latin typeface="맑은 고딕" charset="0"/>
-                <a:ea typeface="맑은 고딕" charset="0"/>
-              </a:rPr>
-              <a:t>선택하고</a:t>
-            </a:r>
-            <a:r>
-              <a:rPr lang="ko-KR" sz="1800" b="0">
-                <a:solidFill>
-                  <a:schemeClr val="tx1"/>
-                </a:solidFill>
-                <a:latin typeface="맑은 고딕" charset="0"/>
-                <a:ea typeface="맑은 고딕" charset="0"/>
-              </a:rPr>
-              <a:t> </a:t>
-            </a:r>
-            <a:r>
-              <a:rPr lang="ko-KR" sz="1800" b="0">
-                <a:solidFill>
-                  <a:schemeClr val="tx1"/>
-                </a:solidFill>
-                <a:latin typeface="맑은 고딕" charset="0"/>
-                <a:ea typeface="맑은 고딕" charset="0"/>
-              </a:rPr>
-              <a:t>Box</a:t>
-            </a:r>
-            <a:r>
-              <a:rPr lang="ko-KR" sz="1800" b="0">
-                <a:solidFill>
-                  <a:schemeClr val="tx1"/>
-                </a:solidFill>
-                <a:latin typeface="맑은 고딕" charset="0"/>
-                <a:ea typeface="맑은 고딕" charset="0"/>
-              </a:rPr>
-              <a:t> </a:t>
-            </a:r>
-            <a:r>
-              <a:rPr lang="ko-KR" sz="1800" b="0">
-                <a:solidFill>
-                  <a:schemeClr val="tx1"/>
-                </a:solidFill>
-                <a:latin typeface="맑은 고딕" charset="0"/>
-                <a:ea typeface="맑은 고딕" charset="0"/>
-              </a:rPr>
-              <a:t>오브젝트에</a:t>
-            </a:r>
-            <a:r>
-              <a:rPr lang="ko-KR" sz="1800" b="0">
-                <a:solidFill>
-                  <a:schemeClr val="tx1"/>
-                </a:solidFill>
-                <a:latin typeface="맑은 고딕" charset="0"/>
-                <a:ea typeface="맑은 고딕" charset="0"/>
-              </a:rPr>
-              <a:t> </a:t>
-            </a:r>
-            <a:r>
-              <a:rPr lang="ko-KR" sz="1800" b="0">
-                <a:solidFill>
-                  <a:schemeClr val="tx1"/>
-                </a:solidFill>
-                <a:latin typeface="맑은 고딕" charset="0"/>
-                <a:ea typeface="맑은 고딕" charset="0"/>
-              </a:rPr>
-              <a:t>넣어줍니다.</a:t>
-            </a:r>
-            <a:endParaRPr lang="ko-KR" altLang="en-US" sz="1800" b="0">
-              <a:solidFill>
-                <a:schemeClr val="tx1"/>
-              </a:solidFill>
-              <a:latin typeface="맑은 고딕" charset="0"/>
-              <a:ea typeface="맑은 고딕" charset="0"/>
-            </a:endParaRPr>
-          </a:p>
-        </p:txBody>
-      </p:sp>
       <p:pic>
         <p:nvPicPr>
-          <p:cNvPr id="42" name="그림 69"/>
+          <p:cNvPr id="46" name="그림 28" descr="C:/Users/Admin1/AppData/Roaming/PolarisOffice/ETemp/16636_18866920/fImage124272065705.png"/>
           <p:cNvPicPr>
             <a:picLocks noChangeAspect="1"/>
           </p:cNvPicPr>
           <p:nvPr/>
         </p:nvPicPr>
         <p:blipFill rotWithShape="1">
-          <a:blip r:embed="rId5" cstate="print">
-            <a:extLst>
-              <a:ext uri="{28A0092B-C50C-407E-A947-70E740481C1C}">
-                <a14:useLocalDpi xmlns:a14="http://schemas.microsoft.com/office/drawing/2010/main" val="0"/>
-              </a:ext>
-            </a:extLst>
-          </a:blip>
-          <a:stretch>
-            <a:fillRect/>
-          </a:stretch>
-        </p:blipFill>
-        <p:spPr>
-          <a:xfrm rot="0">
-            <a:off x="6788150" y="1385570"/>
-            <a:ext cx="1245235" cy="1376680"/>
-          </a:xfrm>
-          <a:prstGeom prst="roundRect"/>
-          <a:solidFill>
-            <a:srgbClr val="EDEDED"/>
-          </a:solidFill>
-        </p:spPr>
-      </p:pic>
-      <p:pic>
-        <p:nvPicPr>
-          <p:cNvPr id="43" name="그림 72" descr="C:/Users/Admin1/AppData/Roaming/PolarisOffice/ETemp/19428_13742608/fImage9006217292.png"/>
-          <p:cNvPicPr>
-            <a:picLocks noChangeAspect="1"/>
-          </p:cNvPicPr>
-          <p:nvPr/>
-        </p:nvPicPr>
-        <p:blipFill rotWithShape="1">
-          <a:blip r:embed="rId6" cstate="hqprint">
+          <a:blip r:embed="rId8" cstate="hqprint">
             <a:extLst>
               <a:ext uri="{28A0092B-C50C-407E-A947-70E740481C1C}">
                 <a14:useLocalDpi xmlns:a14="http://schemas.microsoft.com/office/drawing/2010/main"/>
@@ -7329,8 +7090,8 @@
         </p:blipFill>
         <p:spPr>
           <a:xfrm rot="0">
-            <a:off x="6783705" y="3035935"/>
-            <a:ext cx="4277360" cy="1080135"/>
+            <a:off x="1247775" y="1457325"/>
+            <a:ext cx="4124325" cy="1649095"/>
           </a:xfrm>
           <a:prstGeom prst="roundRect"/>
           <a:solidFill>
@@ -7340,17 +7101,17 @@
       </p:pic>
       <p:pic>
         <p:nvPicPr>
-          <p:cNvPr id="46" name="그림 28" descr="C:/Users/Admin1/AppData/Roaming/PolarisOffice/ETemp/19428_13742608/fImage124272065705.png"/>
+          <p:cNvPr id="47" name="그림 31" descr="C:/Users/Admin1/AppData/Roaming/PolarisOffice/ETemp/16636_18866920/fImage125992078145.png"/>
           <p:cNvPicPr>
             <a:picLocks noChangeAspect="1"/>
           </p:cNvPicPr>
           <p:nvPr/>
         </p:nvPicPr>
         <p:blipFill rotWithShape="1">
-          <a:blip r:embed="rId8" cstate="print">
+          <a:blip r:embed="rId9" cstate="hqprint">
             <a:extLst>
               <a:ext uri="{28A0092B-C50C-407E-A947-70E740481C1C}">
-                <a14:useLocalDpi xmlns:a14="http://schemas.microsoft.com/office/drawing/2010/main" val="0"/>
+                <a14:useLocalDpi xmlns:a14="http://schemas.microsoft.com/office/drawing/2010/main"/>
               </a:ext>
             </a:extLst>
           </a:blip>
@@ -7360,8 +7121,8 @@
         </p:blipFill>
         <p:spPr>
           <a:xfrm rot="0">
-            <a:off x="1424940" y="1383030"/>
-            <a:ext cx="3946525" cy="1722755"/>
+            <a:off x="1238250" y="3361690"/>
+            <a:ext cx="4123690" cy="1639570"/>
           </a:xfrm>
           <a:prstGeom prst="roundRect"/>
           <a:solidFill>
@@ -7369,100 +7130,6 @@
           </a:solidFill>
         </p:spPr>
       </p:pic>
-      <p:pic>
-        <p:nvPicPr>
-          <p:cNvPr id="47" name="그림 31" descr="C:/Users/Admin1/AppData/Roaming/PolarisOffice/ETemp/19428_13742608/fImage125992078145.png"/>
-          <p:cNvPicPr>
-            <a:picLocks noChangeAspect="1"/>
-          </p:cNvPicPr>
-          <p:nvPr/>
-        </p:nvPicPr>
-        <p:blipFill rotWithShape="1">
-          <a:blip r:embed="rId9" cstate="print">
-            <a:extLst>
-              <a:ext uri="{28A0092B-C50C-407E-A947-70E740481C1C}">
-                <a14:useLocalDpi xmlns:a14="http://schemas.microsoft.com/office/drawing/2010/main" val="0"/>
-              </a:ext>
-            </a:extLst>
-          </a:blip>
-          <a:stretch>
-            <a:fillRect/>
-          </a:stretch>
-        </p:blipFill>
-        <p:spPr>
-          <a:xfrm rot="0">
-            <a:off x="1429385" y="3295015"/>
-            <a:ext cx="3941445" cy="1730375"/>
-          </a:xfrm>
-          <a:prstGeom prst="roundRect"/>
-          <a:solidFill>
-            <a:srgbClr val="EDEDED"/>
-          </a:solidFill>
-        </p:spPr>
-      </p:pic>
-      <p:pic>
-        <p:nvPicPr>
-          <p:cNvPr id="48" name="그림 64" descr="C:/Users/Admin1/AppData/Roaming/PolarisOffice/ETemp/19428_13742608/fImage81982263281.png"/>
-          <p:cNvPicPr>
-            <a:picLocks noChangeAspect="1"/>
-          </p:cNvPicPr>
-          <p:nvPr/>
-        </p:nvPicPr>
-        <p:blipFill rotWithShape="1">
-          <a:blip r:embed="rId10" cstate="print">
-            <a:extLst>
-              <a:ext uri="{28A0092B-C50C-407E-A947-70E740481C1C}">
-                <a14:useLocalDpi xmlns:a14="http://schemas.microsoft.com/office/drawing/2010/main" val="0"/>
-              </a:ext>
-            </a:extLst>
-          </a:blip>
-          <a:stretch>
-            <a:fillRect/>
-          </a:stretch>
-        </p:blipFill>
-        <p:spPr>
-          <a:xfrm rot="0">
-            <a:off x="8162925" y="1385570"/>
-            <a:ext cx="2886710" cy="1377315"/>
-          </a:xfrm>
-          <a:prstGeom prst="roundRect"/>
-          <a:solidFill>
-            <a:srgbClr val="EDEDED"/>
-          </a:solidFill>
-        </p:spPr>
-      </p:pic>
-      <p:cxnSp>
-        <p:nvCxnSpPr>
-          <p:cNvPr id="45" name="도형 79"/>
-          <p:cNvCxnSpPr/>
-          <p:nvPr/>
-        </p:nvCxnSpPr>
-        <p:spPr>
-          <a:xfrm rot="0" flipV="1">
-            <a:off x="7600950" y="2057400"/>
-            <a:ext cx="781685" cy="1248410"/>
-          </a:xfrm>
-          <a:prstGeom prst="straightConnector1"/>
-          <a:ln w="19050" cap="flat" cmpd="sng">
-            <a:prstDash/>
-            <a:tailEnd type="triangle" w="med" len="med"/>
-          </a:ln>
-        </p:spPr>
-        <p:style>
-          <a:lnRef idx="3">
-            <a:schemeClr val="accent2"/>
-          </a:lnRef>
-          <a:fillRef idx="0">
-            <a:schemeClr val="accent2"/>
-          </a:fillRef>
-          <a:effectRef idx="2">
-            <a:schemeClr val="accent2"/>
-          </a:effectRef>
-          <a:fontRef idx="minor">
-            <a:schemeClr val="tx1"/>
-          </a:fontRef>
-        </p:style>
-      </p:cxnSp>
     </p:spTree>
   </p:cSld>
   <p:clrMapOvr>
@@ -9285,7 +8952,7 @@
 </file>
 
 <file path=ppt/slides/slide8.xml><?xml version="1.0" encoding="utf-8"?>
-<p:sld xmlns:a="http://schemas.openxmlformats.org/drawingml/2006/main" xmlns:r="http://schemas.openxmlformats.org/officeDocument/2006/relationships" xmlns:p="http://schemas.openxmlformats.org/presentationml/2006/main">
+<p:sld xmlns:a="http://schemas.openxmlformats.org/drawingml/2006/main" xmlns:r="http://schemas.openxmlformats.org/officeDocument/2006/relationships" xmlns:p="http://schemas.openxmlformats.org/presentationml/2006/main" xmlns:p14="http://schemas.microsoft.com/office/powerpoint/2010/main">
   <p:cSld>
     <p:spTree>
       <p:nvGrpSpPr>
@@ -9361,194 +9028,9 @@
           </a:p>
         </p:txBody>
       </p:sp>
-      <p:sp>
-        <p:nvSpPr>
-          <p:cNvPr id="8" name="텍스트 상자 96"/>
-          <p:cNvSpPr txBox="1">
-            <a:spLocks/>
-          </p:cNvSpPr>
-          <p:nvPr/>
-        </p:nvSpPr>
-        <p:spPr>
-          <a:xfrm rot="0">
-            <a:off x="1476375" y="4869180"/>
-            <a:ext cx="3873500" cy="1231265"/>
-          </a:xfrm>
-          <a:prstGeom prst="rect"/>
-          <a:noFill/>
-          <a:ln w="0">
-            <a:noFill/>
-            <a:prstDash/>
-          </a:ln>
-        </p:spPr>
-        <p:txBody>
-          <a:bodyPr wrap="square" lIns="89535" tIns="46355" rIns="89535" bIns="46355" numCol="1" vert="horz" anchor="t">
-            <a:spAutoFit/>
-          </a:bodyPr>
-          <a:lstStyle/>
-          <a:p>
-            <a:pPr marL="0" indent="0" rtl="0" algn="l" defTabSz="914400" eaLnBrk="1" latinLnBrk="0" hangingPunct="1">
-              <a:buFontTx/>
-              <a:buNone/>
-            </a:pPr>
-            <a:r>
-              <a:rPr lang="ko-KR" sz="2000" b="1">
-                <a:solidFill>
-                  <a:srgbClr val="0611F2"/>
-                </a:solidFill>
-                <a:latin typeface="맑은 고딕" charset="0"/>
-                <a:ea typeface="맑은 고딕" charset="0"/>
-              </a:rPr>
-              <a:t>1</a:t>
-            </a:r>
-            <a:r>
-              <a:rPr lang="ko-KR" sz="2000" b="1">
-                <a:solidFill>
-                  <a:srgbClr val="0611F2"/>
-                </a:solidFill>
-                <a:latin typeface="맑은 고딕" charset="0"/>
-                <a:ea typeface="맑은 고딕" charset="0"/>
-              </a:rPr>
-              <a:t>6</a:t>
-            </a:r>
-            <a:r>
-              <a:rPr lang="ko-KR" sz="2000" b="1">
-                <a:solidFill>
-                  <a:srgbClr val="0611F2"/>
-                </a:solidFill>
-                <a:latin typeface="맑은 고딕" charset="0"/>
-                <a:ea typeface="맑은 고딕" charset="0"/>
-              </a:rPr>
-              <a:t>.</a:t>
-            </a:r>
-            <a:r>
-              <a:rPr sz="2000" b="1">
-                <a:solidFill>
-                  <a:srgbClr val="0611F2"/>
-                </a:solidFill>
-                <a:latin typeface="맑은 고딕" charset="0"/>
-                <a:ea typeface="맑은 고딕" charset="0"/>
-              </a:rPr>
-              <a:t> </a:t>
-            </a:r>
-            <a:r>
-              <a:rPr lang="ko-KR" sz="1800" b="0">
-                <a:solidFill>
-                  <a:schemeClr val="tx1"/>
-                </a:solidFill>
-                <a:latin typeface="맑은 고딕" charset="0"/>
-                <a:ea typeface="맑은 고딕" charset="0"/>
-              </a:rPr>
-              <a:t>이제 Project 폴더에 있는 Textures 폴더에 Camera 텍스처를 Photo Button의 이미지에 넣어줍니다.</a:t>
-            </a:r>
-            <a:endParaRPr lang="ko-KR" altLang="en-US" sz="1800" b="0">
-              <a:solidFill>
-                <a:schemeClr val="tx1"/>
-              </a:solidFill>
-              <a:latin typeface="맑은 고딕" charset="0"/>
-              <a:ea typeface="맑은 고딕" charset="0"/>
-            </a:endParaRPr>
-          </a:p>
-        </p:txBody>
-      </p:sp>
       <p:pic>
         <p:nvPicPr>
-          <p:cNvPr id="9" name="그림 97" descr="C:/Users/Admin1/AppData/Roaming/PolarisOffice/ETemp/19428_13742608/fImage162662482391.png"/>
-          <p:cNvPicPr>
-            <a:picLocks noChangeAspect="1"/>
-          </p:cNvPicPr>
-          <p:nvPr/>
-        </p:nvPicPr>
-        <p:blipFill rotWithShape="1">
-          <a:blip r:embed="rId2" cstate="print">
-            <a:extLst>
-              <a:ext uri="{28A0092B-C50C-407E-A947-70E740481C1C}">
-                <a14:useLocalDpi xmlns:a14="http://schemas.microsoft.com/office/drawing/2010/main" val="0"/>
-              </a:ext>
-            </a:extLst>
-          </a:blip>
-          <a:stretch>
-            <a:fillRect/>
-          </a:stretch>
-        </p:blipFill>
-        <p:spPr>
-          <a:xfrm rot="0">
-            <a:off x="1485900" y="1447800"/>
-            <a:ext cx="3867785" cy="2134235"/>
-          </a:xfrm>
-          <a:prstGeom prst="roundRect"/>
-          <a:solidFill>
-            <a:srgbClr val="EDEDED"/>
-          </a:solidFill>
-        </p:spPr>
-      </p:pic>
-      <p:pic>
-        <p:nvPicPr>
-          <p:cNvPr id="10" name="그림 100" descr="C:/Users/Admin1/AppData/Roaming/PolarisOffice/ETemp/19428_13742608/fImage188032494604.png"/>
-          <p:cNvPicPr>
-            <a:picLocks noChangeAspect="1"/>
-          </p:cNvPicPr>
-          <p:nvPr/>
-        </p:nvPicPr>
-        <p:blipFill rotWithShape="1">
-          <a:blip r:embed="rId3" cstate="print">
-            <a:extLst>
-              <a:ext uri="{28A0092B-C50C-407E-A947-70E740481C1C}">
-                <a14:useLocalDpi xmlns:a14="http://schemas.microsoft.com/office/drawing/2010/main" val="0"/>
-              </a:ext>
-            </a:extLst>
-          </a:blip>
-          <a:stretch>
-            <a:fillRect/>
-          </a:stretch>
-        </p:blipFill>
-        <p:spPr>
-          <a:xfrm rot="0">
-            <a:off x="1476375" y="3781425"/>
-            <a:ext cx="3886835" cy="991235"/>
-          </a:xfrm>
-          <a:prstGeom prst="roundRect"/>
-          <a:solidFill>
-            <a:srgbClr val="EDEDED"/>
-          </a:solidFill>
-        </p:spPr>
-      </p:pic>
-      <p:cxnSp>
-        <p:nvCxnSpPr>
-          <p:cNvPr id="11" name="도형 103"/>
-          <p:cNvCxnSpPr/>
-          <p:nvPr/>
-        </p:nvCxnSpPr>
-        <p:spPr>
-          <a:xfrm rot="0" flipV="1">
-            <a:off x="3457575" y="1800225"/>
-            <a:ext cx="1819910" cy="2219960"/>
-          </a:xfrm>
-          <a:prstGeom prst="straightConnector1"/>
-          <a:ln w="6350" cap="flat" cmpd="sng">
-            <a:prstDash/>
-            <a:headEnd type="none" w="med" len="med"/>
-            <a:tailEnd type="triangle" w="med" len="med"/>
-          </a:ln>
-        </p:spPr>
-        <p:style>
-          <a:lnRef idx="1">
-            <a:schemeClr val="accent1"/>
-          </a:lnRef>
-          <a:fillRef idx="0">
-            <a:schemeClr val="accent1"/>
-          </a:fillRef>
-          <a:effectRef idx="0">
-            <a:schemeClr val="accent1"/>
-          </a:effectRef>
-          <a:fontRef idx="minor">
-            <a:schemeClr val="tx1"/>
-          </a:fontRef>
-        </p:style>
-      </p:cxnSp>
-      <p:pic>
-        <p:nvPicPr>
-          <p:cNvPr id="12" name="그림 104" descr="C:/Users/Admin1/AppData/Roaming/PolarisOffice/ETemp/19428_13742608/fImage122182513902.png"/>
+          <p:cNvPr id="12" name="그림 104"/>
           <p:cNvPicPr>
             <a:picLocks noChangeAspect="1"/>
           </p:cNvPicPr>
@@ -9669,7 +9151,7 @@
       </p:sp>
       <p:pic>
         <p:nvPicPr>
-          <p:cNvPr id="14" name="그림 117" descr="C:/Users/Admin1/AppData/Roaming/PolarisOffice/ETemp/19428_13742608/fImage12007260153.png"/>
+          <p:cNvPr id="14" name="그림 117"/>
           <p:cNvPicPr>
             <a:picLocks noChangeAspect="1"/>
           </p:cNvPicPr>

</xml_diff>